<commit_message>
New edits for discussion
</commit_message>
<xml_diff>
--- a/draft presentation.pptx
+++ b/draft presentation.pptx
@@ -22,8 +22,10 @@
     <p:sldId id="277" r:id="rId16"/>
     <p:sldId id="278" r:id="rId17"/>
     <p:sldId id="279" r:id="rId18"/>
-    <p:sldId id="260" r:id="rId19"/>
-    <p:sldId id="261" r:id="rId20"/>
+    <p:sldId id="280" r:id="rId19"/>
+    <p:sldId id="281" r:id="rId20"/>
+    <p:sldId id="260" r:id="rId21"/>
+    <p:sldId id="261" r:id="rId22"/>
   </p:sldIdLst>
   <p:sldSz cx="12192000" cy="6858000"/>
   <p:notesSz cx="6858000" cy="9144000"/>
@@ -2679,7 +2681,7 @@
           <a:p>
             <a:fld id="{D067743F-2182-4106-A03A-A373E3092490}" type="datetimeFigureOut">
               <a:rPr lang="en-US" smtClean="0"/>
-              <a:t>11/13/2024</a:t>
+              <a:t>11/18/2024</a:t>
             </a:fld>
             <a:endParaRPr lang="en-US"/>
           </a:p>
@@ -2877,7 +2879,7 @@
           <a:p>
             <a:fld id="{D067743F-2182-4106-A03A-A373E3092490}" type="datetimeFigureOut">
               <a:rPr lang="en-US" smtClean="0"/>
-              <a:t>11/13/2024</a:t>
+              <a:t>11/18/2024</a:t>
             </a:fld>
             <a:endParaRPr lang="en-US"/>
           </a:p>
@@ -3085,7 +3087,7 @@
           <a:p>
             <a:fld id="{D067743F-2182-4106-A03A-A373E3092490}" type="datetimeFigureOut">
               <a:rPr lang="en-US" smtClean="0"/>
-              <a:t>11/13/2024</a:t>
+              <a:t>11/18/2024</a:t>
             </a:fld>
             <a:endParaRPr lang="en-US"/>
           </a:p>
@@ -3283,7 +3285,7 @@
           <a:p>
             <a:fld id="{D067743F-2182-4106-A03A-A373E3092490}" type="datetimeFigureOut">
               <a:rPr lang="en-US" smtClean="0"/>
-              <a:t>11/13/2024</a:t>
+              <a:t>11/18/2024</a:t>
             </a:fld>
             <a:endParaRPr lang="en-US"/>
           </a:p>
@@ -3558,7 +3560,7 @@
           <a:p>
             <a:fld id="{D067743F-2182-4106-A03A-A373E3092490}" type="datetimeFigureOut">
               <a:rPr lang="en-US" smtClean="0"/>
-              <a:t>11/13/2024</a:t>
+              <a:t>11/18/2024</a:t>
             </a:fld>
             <a:endParaRPr lang="en-US"/>
           </a:p>
@@ -3823,7 +3825,7 @@
           <a:p>
             <a:fld id="{D067743F-2182-4106-A03A-A373E3092490}" type="datetimeFigureOut">
               <a:rPr lang="en-US" smtClean="0"/>
-              <a:t>11/13/2024</a:t>
+              <a:t>11/18/2024</a:t>
             </a:fld>
             <a:endParaRPr lang="en-US"/>
           </a:p>
@@ -4235,7 +4237,7 @@
           <a:p>
             <a:fld id="{D067743F-2182-4106-A03A-A373E3092490}" type="datetimeFigureOut">
               <a:rPr lang="en-US" smtClean="0"/>
-              <a:t>11/13/2024</a:t>
+              <a:t>11/18/2024</a:t>
             </a:fld>
             <a:endParaRPr lang="en-US"/>
           </a:p>
@@ -4376,7 +4378,7 @@
           <a:p>
             <a:fld id="{D067743F-2182-4106-A03A-A373E3092490}" type="datetimeFigureOut">
               <a:rPr lang="en-US" smtClean="0"/>
-              <a:t>11/13/2024</a:t>
+              <a:t>11/18/2024</a:t>
             </a:fld>
             <a:endParaRPr lang="en-US"/>
           </a:p>
@@ -4489,7 +4491,7 @@
           <a:p>
             <a:fld id="{D067743F-2182-4106-A03A-A373E3092490}" type="datetimeFigureOut">
               <a:rPr lang="en-US" smtClean="0"/>
-              <a:t>11/13/2024</a:t>
+              <a:t>11/18/2024</a:t>
             </a:fld>
             <a:endParaRPr lang="en-US"/>
           </a:p>
@@ -4800,7 +4802,7 @@
           <a:p>
             <a:fld id="{D067743F-2182-4106-A03A-A373E3092490}" type="datetimeFigureOut">
               <a:rPr lang="en-US" smtClean="0"/>
-              <a:t>11/13/2024</a:t>
+              <a:t>11/18/2024</a:t>
             </a:fld>
             <a:endParaRPr lang="en-US"/>
           </a:p>
@@ -5088,7 +5090,7 @@
           <a:p>
             <a:fld id="{D067743F-2182-4106-A03A-A373E3092490}" type="datetimeFigureOut">
               <a:rPr lang="en-US" smtClean="0"/>
-              <a:t>11/13/2024</a:t>
+              <a:t>11/18/2024</a:t>
             </a:fld>
             <a:endParaRPr lang="en-US"/>
           </a:p>
@@ -5329,7 +5331,7 @@
           <a:p>
             <a:fld id="{D067743F-2182-4106-A03A-A373E3092490}" type="datetimeFigureOut">
               <a:rPr lang="en-US" smtClean="0"/>
-              <a:t>11/13/2024</a:t>
+              <a:t>11/18/2024</a:t>
             </a:fld>
             <a:endParaRPr lang="en-US"/>
           </a:p>
@@ -10810,7 +10812,13 @@
   <p:cSld>
     <p:spTree>
       <p:nvGrpSpPr>
-        <p:cNvPr id="1" name=""/>
+        <p:cNvPr id="1" name="">
+          <a:extLst>
+            <a:ext uri="{FF2B5EF4-FFF2-40B4-BE49-F238E27FC236}">
+              <a16:creationId xmlns:a16="http://schemas.microsoft.com/office/drawing/2014/main" id="{812E51B7-5BD1-3C06-1D77-37EB126B5388}"/>
+            </a:ext>
+          </a:extLst>
+        </p:cNvPr>
         <p:cNvGrpSpPr/>
         <p:nvPr/>
       </p:nvGrpSpPr>
@@ -10822,12 +10830,344 @@
           <a:chExt cx="0" cy="0"/>
         </a:xfrm>
       </p:grpSpPr>
+      <p:sp>
+        <p:nvSpPr>
+          <p:cNvPr id="2" name="Title 1">
+            <a:extLst>
+              <a:ext uri="{FF2B5EF4-FFF2-40B4-BE49-F238E27FC236}">
+                <a16:creationId xmlns:a16="http://schemas.microsoft.com/office/drawing/2014/main" id="{B41E40BE-FC49-5BA0-3729-239BAF4C31E7}"/>
+              </a:ext>
+            </a:extLst>
+          </p:cNvPr>
+          <p:cNvSpPr>
+            <a:spLocks noGrp="1"/>
+          </p:cNvSpPr>
+          <p:nvPr>
+            <p:ph type="title"/>
+          </p:nvPr>
+        </p:nvSpPr>
+        <p:spPr>
+          <a:xfrm>
+            <a:off x="343764" y="-516485"/>
+            <a:ext cx="10303915" cy="1455996"/>
+          </a:xfrm>
+        </p:spPr>
+        <p:txBody>
+          <a:bodyPr vert="horz" lIns="91440" tIns="45720" rIns="91440" bIns="45720" rtlCol="0" anchor="b">
+            <a:normAutofit/>
+          </a:bodyPr>
+          <a:lstStyle/>
+          <a:p>
+            <a:r>
+              <a:rPr lang="en-US" sz="4800" dirty="0">
+                <a:solidFill>
+                  <a:schemeClr val="tx2"/>
+                </a:solidFill>
+              </a:rPr>
+              <a:t>How to quickly explain analysis changes</a:t>
+            </a:r>
+          </a:p>
+        </p:txBody>
+      </p:sp>
+      <p:sp>
+        <p:nvSpPr>
+          <p:cNvPr id="16" name="Rectangle 8">
+            <a:extLst>
+              <a:ext uri="{FF2B5EF4-FFF2-40B4-BE49-F238E27FC236}">
+                <a16:creationId xmlns:a16="http://schemas.microsoft.com/office/drawing/2014/main" id="{1A1C8A88-20F3-A799-DE47-F5C30FCF9137}"/>
+              </a:ext>
+            </a:extLst>
+          </p:cNvPr>
+          <p:cNvSpPr>
+            <a:spLocks noChangeArrowheads="1"/>
+          </p:cNvSpPr>
+          <p:nvPr/>
+        </p:nvSpPr>
+        <p:spPr bwMode="auto">
+          <a:xfrm>
+            <a:off x="7094611" y="1188839"/>
+            <a:ext cx="4091845" cy="1600438"/>
+          </a:xfrm>
+          <a:prstGeom prst="rect">
+            <a:avLst/>
+          </a:prstGeom>
+          <a:noFill/>
+          <a:ln>
+            <a:noFill/>
+          </a:ln>
+          <a:effectLst/>
+          <a:extLst>
+            <a:ext uri="{909E8E84-426E-40DD-AFC4-6F175D3DCCD1}">
+              <a14:hiddenFill xmlns:a14="http://schemas.microsoft.com/office/drawing/2010/main">
+                <a:solidFill>
+                  <a:schemeClr val="accent1"/>
+                </a:solidFill>
+              </a14:hiddenFill>
+            </a:ext>
+            <a:ext uri="{91240B29-F687-4F45-9708-019B960494DF}">
+              <a14:hiddenLine xmlns:a14="http://schemas.microsoft.com/office/drawing/2010/main" w="9525">
+                <a:solidFill>
+                  <a:schemeClr val="tx1"/>
+                </a:solidFill>
+                <a:miter lim="800000"/>
+                <a:headEnd/>
+                <a:tailEnd/>
+              </a14:hiddenLine>
+            </a:ext>
+            <a:ext uri="{AF507438-7753-43E0-B8FC-AC1667EBCBE1}">
+              <a14:hiddenEffects xmlns:a14="http://schemas.microsoft.com/office/drawing/2010/main">
+                <a:effectLst>
+                  <a:outerShdw dist="35921" dir="2700000" algn="ctr" rotWithShape="0">
+                    <a:schemeClr val="bg2"/>
+                  </a:outerShdw>
+                </a:effectLst>
+              </a14:hiddenEffects>
+            </a:ext>
+          </a:extLst>
+        </p:spPr>
+        <p:txBody>
+          <a:bodyPr vert="horz" wrap="square" lIns="91440" tIns="45720" rIns="91440" bIns="45720" numCol="1" anchor="ctr" anchorCtr="0" compatLnSpc="1">
+            <a:prstTxWarp prst="textNoShape">
+              <a:avLst/>
+            </a:prstTxWarp>
+            <a:spAutoFit/>
+          </a:bodyPr>
+          <a:lstStyle>
+            <a:lvl1pPr eaLnBrk="0" fontAlgn="base" hangingPunct="0">
+              <a:spcBef>
+                <a:spcPct val="0"/>
+              </a:spcBef>
+              <a:spcAft>
+                <a:spcPct val="0"/>
+              </a:spcAft>
+              <a:defRPr>
+                <a:solidFill>
+                  <a:schemeClr val="tx1"/>
+                </a:solidFill>
+                <a:latin typeface="Arial" panose="020B0604020202020204" pitchFamily="34" charset="0"/>
+              </a:defRPr>
+            </a:lvl1pPr>
+            <a:lvl2pPr eaLnBrk="0" fontAlgn="base" hangingPunct="0">
+              <a:spcBef>
+                <a:spcPct val="0"/>
+              </a:spcBef>
+              <a:spcAft>
+                <a:spcPct val="0"/>
+              </a:spcAft>
+              <a:defRPr>
+                <a:solidFill>
+                  <a:schemeClr val="tx1"/>
+                </a:solidFill>
+                <a:latin typeface="Arial" panose="020B0604020202020204" pitchFamily="34" charset="0"/>
+              </a:defRPr>
+            </a:lvl2pPr>
+            <a:lvl3pPr eaLnBrk="0" fontAlgn="base" hangingPunct="0">
+              <a:spcBef>
+                <a:spcPct val="0"/>
+              </a:spcBef>
+              <a:spcAft>
+                <a:spcPct val="0"/>
+              </a:spcAft>
+              <a:defRPr>
+                <a:solidFill>
+                  <a:schemeClr val="tx1"/>
+                </a:solidFill>
+                <a:latin typeface="Arial" panose="020B0604020202020204" pitchFamily="34" charset="0"/>
+              </a:defRPr>
+            </a:lvl3pPr>
+            <a:lvl4pPr eaLnBrk="0" fontAlgn="base" hangingPunct="0">
+              <a:spcBef>
+                <a:spcPct val="0"/>
+              </a:spcBef>
+              <a:spcAft>
+                <a:spcPct val="0"/>
+              </a:spcAft>
+              <a:defRPr>
+                <a:solidFill>
+                  <a:schemeClr val="tx1"/>
+                </a:solidFill>
+                <a:latin typeface="Arial" panose="020B0604020202020204" pitchFamily="34" charset="0"/>
+              </a:defRPr>
+            </a:lvl4pPr>
+            <a:lvl5pPr eaLnBrk="0" fontAlgn="base" hangingPunct="0">
+              <a:spcBef>
+                <a:spcPct val="0"/>
+              </a:spcBef>
+              <a:spcAft>
+                <a:spcPct val="0"/>
+              </a:spcAft>
+              <a:defRPr>
+                <a:solidFill>
+                  <a:schemeClr val="tx1"/>
+                </a:solidFill>
+                <a:latin typeface="Arial" panose="020B0604020202020204" pitchFamily="34" charset="0"/>
+              </a:defRPr>
+            </a:lvl5pPr>
+            <a:lvl6pPr eaLnBrk="0" fontAlgn="base" hangingPunct="0">
+              <a:spcBef>
+                <a:spcPct val="0"/>
+              </a:spcBef>
+              <a:spcAft>
+                <a:spcPct val="0"/>
+              </a:spcAft>
+              <a:defRPr>
+                <a:solidFill>
+                  <a:schemeClr val="tx1"/>
+                </a:solidFill>
+                <a:latin typeface="Arial" panose="020B0604020202020204" pitchFamily="34" charset="0"/>
+              </a:defRPr>
+            </a:lvl6pPr>
+            <a:lvl7pPr eaLnBrk="0" fontAlgn="base" hangingPunct="0">
+              <a:spcBef>
+                <a:spcPct val="0"/>
+              </a:spcBef>
+              <a:spcAft>
+                <a:spcPct val="0"/>
+              </a:spcAft>
+              <a:defRPr>
+                <a:solidFill>
+                  <a:schemeClr val="tx1"/>
+                </a:solidFill>
+                <a:latin typeface="Arial" panose="020B0604020202020204" pitchFamily="34" charset="0"/>
+              </a:defRPr>
+            </a:lvl7pPr>
+            <a:lvl8pPr eaLnBrk="0" fontAlgn="base" hangingPunct="0">
+              <a:spcBef>
+                <a:spcPct val="0"/>
+              </a:spcBef>
+              <a:spcAft>
+                <a:spcPct val="0"/>
+              </a:spcAft>
+              <a:defRPr>
+                <a:solidFill>
+                  <a:schemeClr val="tx1"/>
+                </a:solidFill>
+                <a:latin typeface="Arial" panose="020B0604020202020204" pitchFamily="34" charset="0"/>
+              </a:defRPr>
+            </a:lvl8pPr>
+            <a:lvl9pPr eaLnBrk="0" fontAlgn="base" hangingPunct="0">
+              <a:spcBef>
+                <a:spcPct val="0"/>
+              </a:spcBef>
+              <a:spcAft>
+                <a:spcPct val="0"/>
+              </a:spcAft>
+              <a:defRPr>
+                <a:solidFill>
+                  <a:schemeClr val="tx1"/>
+                </a:solidFill>
+                <a:latin typeface="Arial" panose="020B0604020202020204" pitchFamily="34" charset="0"/>
+              </a:defRPr>
+            </a:lvl9pPr>
+          </a:lstStyle>
+          <a:p>
+            <a:pPr marL="0" marR="0" lvl="0" indent="0" algn="l" defTabSz="914400" rtl="0" eaLnBrk="0" fontAlgn="base" latinLnBrk="0" hangingPunct="0">
+              <a:lnSpc>
+                <a:spcPct val="100000"/>
+              </a:lnSpc>
+              <a:spcBef>
+                <a:spcPct val="0"/>
+              </a:spcBef>
+              <a:spcAft>
+                <a:spcPct val="0"/>
+              </a:spcAft>
+              <a:buClrTx/>
+              <a:buSzTx/>
+              <a:buFontTx/>
+              <a:buNone/>
+              <a:tabLst/>
+            </a:pPr>
+            <a:r>
+              <a:rPr kumimoji="0" lang="en-US" altLang="en-US" sz="1400" b="0" i="0" u="none" strike="noStrike" cap="none" normalizeH="0" baseline="0" dirty="0">
+                <a:ln>
+                  <a:noFill/>
+                </a:ln>
+                <a:solidFill>
+                  <a:srgbClr val="222832"/>
+                </a:solidFill>
+                <a:effectLst/>
+                <a:latin typeface="Calibri" panose="020F0502020204030204" pitchFamily="34" charset="0"/>
+                <a:cs typeface="Calibri" panose="020F0502020204030204" pitchFamily="34" charset="0"/>
+              </a:rPr>
+              <a:t>From month to month or year to year, actuarial analyses change based on the data. In an Excel environment, analysis files often need to be copied and therefore prone to manual errors. </a:t>
+            </a:r>
+          </a:p>
+          <a:p>
+            <a:pPr marL="0" marR="0" lvl="0" indent="0" algn="l" defTabSz="914400" rtl="0" eaLnBrk="0" fontAlgn="base" latinLnBrk="0" hangingPunct="0">
+              <a:lnSpc>
+                <a:spcPct val="100000"/>
+              </a:lnSpc>
+              <a:spcBef>
+                <a:spcPct val="0"/>
+              </a:spcBef>
+              <a:spcAft>
+                <a:spcPct val="0"/>
+              </a:spcAft>
+              <a:buClrTx/>
+              <a:buSzTx/>
+              <a:buFontTx/>
+              <a:buNone/>
+              <a:tabLst/>
+            </a:pPr>
+            <a:endParaRPr lang="en-US" altLang="en-US" sz="1400" dirty="0">
+              <a:solidFill>
+                <a:srgbClr val="222832"/>
+              </a:solidFill>
+              <a:latin typeface="Calibri" panose="020F0502020204030204" pitchFamily="34" charset="0"/>
+              <a:cs typeface="Calibri" panose="020F0502020204030204" pitchFamily="34" charset="0"/>
+            </a:endParaRPr>
+          </a:p>
+          <a:p>
+            <a:pPr marL="0" marR="0" lvl="0" indent="0" algn="l" defTabSz="914400" rtl="0" eaLnBrk="0" fontAlgn="base" latinLnBrk="0" hangingPunct="0">
+              <a:lnSpc>
+                <a:spcPct val="100000"/>
+              </a:lnSpc>
+              <a:spcBef>
+                <a:spcPct val="0"/>
+              </a:spcBef>
+              <a:spcAft>
+                <a:spcPct val="0"/>
+              </a:spcAft>
+              <a:buClrTx/>
+              <a:buSzTx/>
+              <a:buFontTx/>
+              <a:buNone/>
+              <a:tabLst/>
+            </a:pPr>
+            <a:r>
+              <a:rPr kumimoji="0" lang="en-US" altLang="en-US" sz="1400" b="0" i="0" u="none" strike="noStrike" cap="none" normalizeH="0" baseline="0" dirty="0">
+                <a:ln>
+                  <a:noFill/>
+                </a:ln>
+                <a:solidFill>
+                  <a:srgbClr val="222832"/>
+                </a:solidFill>
+                <a:effectLst/>
+                <a:latin typeface="Calibri" panose="020F0502020204030204" pitchFamily="34" charset="0"/>
+                <a:cs typeface="Calibri" panose="020F0502020204030204" pitchFamily="34" charset="0"/>
+              </a:rPr>
+              <a:t>For multiple methods per segment and multiple segment overall, this quickly gets out of hand</a:t>
+            </a:r>
+            <a:endParaRPr kumimoji="0" lang="en-US" altLang="en-US" sz="1400" b="0" i="0" u="none" strike="noStrike" cap="none" normalizeH="0" baseline="0" dirty="0">
+              <a:ln>
+                <a:noFill/>
+              </a:ln>
+              <a:solidFill>
+                <a:schemeClr val="tx1"/>
+              </a:solidFill>
+              <a:effectLst/>
+              <a:latin typeface="Calibri" panose="020F0502020204030204" pitchFamily="34" charset="0"/>
+              <a:cs typeface="Calibri" panose="020F0502020204030204" pitchFamily="34" charset="0"/>
+            </a:endParaRPr>
+          </a:p>
+        </p:txBody>
+      </p:sp>
       <p:pic>
         <p:nvPicPr>
-          <p:cNvPr id="4" name="Picture 3">
+          <p:cNvPr id="3" name="Picture 2">
             <a:extLst>
               <a:ext uri="{FF2B5EF4-FFF2-40B4-BE49-F238E27FC236}">
-                <a16:creationId xmlns:a16="http://schemas.microsoft.com/office/drawing/2014/main" id="{7AF334B1-B273-D0DA-BE07-F29ACFC02334}"/>
+                <a16:creationId xmlns:a16="http://schemas.microsoft.com/office/drawing/2014/main" id="{D7BADC26-4A07-4466-8F12-A849F275B747}"/>
               </a:ext>
             </a:extLst>
           </p:cNvPr>
@@ -10844,8 +11184,128 @@
         </p:blipFill>
         <p:spPr>
           <a:xfrm>
-            <a:off x="584664" y="279258"/>
-            <a:ext cx="10159851" cy="4965809"/>
+            <a:off x="6537306" y="3230771"/>
+            <a:ext cx="4982934" cy="1820316"/>
+          </a:xfrm>
+          <a:prstGeom prst="rect">
+            <a:avLst/>
+          </a:prstGeom>
+        </p:spPr>
+      </p:pic>
+      <p:pic>
+        <p:nvPicPr>
+          <p:cNvPr id="5" name="Picture 4">
+            <a:extLst>
+              <a:ext uri="{FF2B5EF4-FFF2-40B4-BE49-F238E27FC236}">
+                <a16:creationId xmlns:a16="http://schemas.microsoft.com/office/drawing/2014/main" id="{A31DDC92-E374-4094-B866-1D18C3523354}"/>
+              </a:ext>
+            </a:extLst>
+          </p:cNvPr>
+          <p:cNvPicPr>
+            <a:picLocks noChangeAspect="1"/>
+          </p:cNvPicPr>
+          <p:nvPr/>
+        </p:nvPicPr>
+        <p:blipFill>
+          <a:blip r:embed="rId3"/>
+          <a:stretch>
+            <a:fillRect/>
+          </a:stretch>
+        </p:blipFill>
+        <p:spPr>
+          <a:xfrm>
+            <a:off x="1877924" y="935162"/>
+            <a:ext cx="3496715" cy="1460345"/>
+          </a:xfrm>
+          <a:prstGeom prst="rect">
+            <a:avLst/>
+          </a:prstGeom>
+        </p:spPr>
+      </p:pic>
+      <p:pic>
+        <p:nvPicPr>
+          <p:cNvPr id="6" name="Picture 5">
+            <a:extLst>
+              <a:ext uri="{FF2B5EF4-FFF2-40B4-BE49-F238E27FC236}">
+                <a16:creationId xmlns:a16="http://schemas.microsoft.com/office/drawing/2014/main" id="{6203953E-FFF4-4D1B-96AB-B3B560FAC489}"/>
+              </a:ext>
+            </a:extLst>
+          </p:cNvPr>
+          <p:cNvPicPr>
+            <a:picLocks noChangeAspect="1"/>
+          </p:cNvPicPr>
+          <p:nvPr/>
+        </p:nvPicPr>
+        <p:blipFill>
+          <a:blip r:embed="rId4"/>
+          <a:stretch>
+            <a:fillRect/>
+          </a:stretch>
+        </p:blipFill>
+        <p:spPr>
+          <a:xfrm>
+            <a:off x="1877923" y="2395507"/>
+            <a:ext cx="3589259" cy="1455996"/>
+          </a:xfrm>
+          <a:prstGeom prst="rect">
+            <a:avLst/>
+          </a:prstGeom>
+        </p:spPr>
+      </p:pic>
+      <p:pic>
+        <p:nvPicPr>
+          <p:cNvPr id="8" name="Picture 7">
+            <a:extLst>
+              <a:ext uri="{FF2B5EF4-FFF2-40B4-BE49-F238E27FC236}">
+                <a16:creationId xmlns:a16="http://schemas.microsoft.com/office/drawing/2014/main" id="{226FD7FD-7EBD-408D-B5B4-F2C3CD7F776F}"/>
+              </a:ext>
+            </a:extLst>
+          </p:cNvPr>
+          <p:cNvPicPr>
+            <a:picLocks noChangeAspect="1"/>
+          </p:cNvPicPr>
+          <p:nvPr/>
+        </p:nvPicPr>
+        <p:blipFill>
+          <a:blip r:embed="rId5"/>
+          <a:stretch>
+            <a:fillRect/>
+          </a:stretch>
+        </p:blipFill>
+        <p:spPr>
+          <a:xfrm>
+            <a:off x="1877924" y="3857880"/>
+            <a:ext cx="3496715" cy="1449619"/>
+          </a:xfrm>
+          <a:prstGeom prst="rect">
+            <a:avLst/>
+          </a:prstGeom>
+        </p:spPr>
+      </p:pic>
+      <p:pic>
+        <p:nvPicPr>
+          <p:cNvPr id="9" name="Picture 8">
+            <a:extLst>
+              <a:ext uri="{FF2B5EF4-FFF2-40B4-BE49-F238E27FC236}">
+                <a16:creationId xmlns:a16="http://schemas.microsoft.com/office/drawing/2014/main" id="{5222B271-EAA4-40D6-B6D8-D175613CD591}"/>
+              </a:ext>
+            </a:extLst>
+          </p:cNvPr>
+          <p:cNvPicPr>
+            <a:picLocks noChangeAspect="1"/>
+          </p:cNvPicPr>
+          <p:nvPr/>
+        </p:nvPicPr>
+        <p:blipFill>
+          <a:blip r:embed="rId6"/>
+          <a:stretch>
+            <a:fillRect/>
+          </a:stretch>
+        </p:blipFill>
+        <p:spPr>
+          <a:xfrm>
+            <a:off x="1877923" y="5307057"/>
+            <a:ext cx="3496716" cy="1451881"/>
           </a:xfrm>
           <a:prstGeom prst="rect">
             <a:avLst/>
@@ -10854,90 +11314,840 @@
       </p:pic>
       <p:sp>
         <p:nvSpPr>
-          <p:cNvPr id="5" name="TextBox 4">
+          <p:cNvPr id="11" name="Rectangle 8">
             <a:extLst>
               <a:ext uri="{FF2B5EF4-FFF2-40B4-BE49-F238E27FC236}">
-                <a16:creationId xmlns:a16="http://schemas.microsoft.com/office/drawing/2014/main" id="{6B6CCA69-2AED-14B9-7822-7FEC702DEBF3}"/>
+                <a16:creationId xmlns:a16="http://schemas.microsoft.com/office/drawing/2014/main" id="{16AD8980-0660-4D6E-B14B-1E3B0D5C00C1}"/>
               </a:ext>
             </a:extLst>
           </p:cNvPr>
-          <p:cNvSpPr txBox="1"/>
+          <p:cNvSpPr>
+            <a:spLocks noChangeArrowheads="1"/>
+          </p:cNvSpPr>
           <p:nvPr/>
         </p:nvSpPr>
-        <p:spPr>
+        <p:spPr bwMode="auto">
           <a:xfrm>
-            <a:off x="792482" y="5536013"/>
-            <a:ext cx="10430932" cy="646331"/>
+            <a:off x="250494" y="1536362"/>
+            <a:ext cx="4091845" cy="4616648"/>
           </a:xfrm>
           <a:prstGeom prst="rect">
             <a:avLst/>
           </a:prstGeom>
           <a:noFill/>
+          <a:ln>
+            <a:noFill/>
+          </a:ln>
+          <a:effectLst/>
+          <a:extLst>
+            <a:ext uri="{909E8E84-426E-40DD-AFC4-6F175D3DCCD1}">
+              <a14:hiddenFill xmlns:a14="http://schemas.microsoft.com/office/drawing/2010/main">
+                <a:solidFill>
+                  <a:schemeClr val="accent1"/>
+                </a:solidFill>
+              </a14:hiddenFill>
+            </a:ext>
+            <a:ext uri="{91240B29-F687-4F45-9708-019B960494DF}">
+              <a14:hiddenLine xmlns:a14="http://schemas.microsoft.com/office/drawing/2010/main" w="9525">
+                <a:solidFill>
+                  <a:schemeClr val="tx1"/>
+                </a:solidFill>
+                <a:miter lim="800000"/>
+                <a:headEnd/>
+                <a:tailEnd/>
+              </a14:hiddenLine>
+            </a:ext>
+            <a:ext uri="{AF507438-7753-43E0-B8FC-AC1667EBCBE1}">
+              <a14:hiddenEffects xmlns:a14="http://schemas.microsoft.com/office/drawing/2010/main">
+                <a:effectLst>
+                  <a:outerShdw dist="35921" dir="2700000" algn="ctr" rotWithShape="0">
+                    <a:schemeClr val="bg2"/>
+                  </a:outerShdw>
+                </a:effectLst>
+              </a14:hiddenEffects>
+            </a:ext>
+          </a:extLst>
         </p:spPr>
         <p:txBody>
-          <a:bodyPr wrap="square" rtlCol="0">
+          <a:bodyPr vert="horz" wrap="square" lIns="91440" tIns="45720" rIns="91440" bIns="45720" numCol="1" anchor="ctr" anchorCtr="0" compatLnSpc="1">
+            <a:prstTxWarp prst="textNoShape">
+              <a:avLst/>
+            </a:prstTxWarp>
             <a:spAutoFit/>
           </a:bodyPr>
-          <a:lstStyle/>
-          <a:p>
+          <a:lstStyle>
+            <a:lvl1pPr eaLnBrk="0" fontAlgn="base" hangingPunct="0">
+              <a:spcBef>
+                <a:spcPct val="0"/>
+              </a:spcBef>
+              <a:spcAft>
+                <a:spcPct val="0"/>
+              </a:spcAft>
+              <a:defRPr>
+                <a:solidFill>
+                  <a:schemeClr val="tx1"/>
+                </a:solidFill>
+                <a:latin typeface="Arial" panose="020B0604020202020204" pitchFamily="34" charset="0"/>
+              </a:defRPr>
+            </a:lvl1pPr>
+            <a:lvl2pPr eaLnBrk="0" fontAlgn="base" hangingPunct="0">
+              <a:spcBef>
+                <a:spcPct val="0"/>
+              </a:spcBef>
+              <a:spcAft>
+                <a:spcPct val="0"/>
+              </a:spcAft>
+              <a:defRPr>
+                <a:solidFill>
+                  <a:schemeClr val="tx1"/>
+                </a:solidFill>
+                <a:latin typeface="Arial" panose="020B0604020202020204" pitchFamily="34" charset="0"/>
+              </a:defRPr>
+            </a:lvl2pPr>
+            <a:lvl3pPr eaLnBrk="0" fontAlgn="base" hangingPunct="0">
+              <a:spcBef>
+                <a:spcPct val="0"/>
+              </a:spcBef>
+              <a:spcAft>
+                <a:spcPct val="0"/>
+              </a:spcAft>
+              <a:defRPr>
+                <a:solidFill>
+                  <a:schemeClr val="tx1"/>
+                </a:solidFill>
+                <a:latin typeface="Arial" panose="020B0604020202020204" pitchFamily="34" charset="0"/>
+              </a:defRPr>
+            </a:lvl3pPr>
+            <a:lvl4pPr eaLnBrk="0" fontAlgn="base" hangingPunct="0">
+              <a:spcBef>
+                <a:spcPct val="0"/>
+              </a:spcBef>
+              <a:spcAft>
+                <a:spcPct val="0"/>
+              </a:spcAft>
+              <a:defRPr>
+                <a:solidFill>
+                  <a:schemeClr val="tx1"/>
+                </a:solidFill>
+                <a:latin typeface="Arial" panose="020B0604020202020204" pitchFamily="34" charset="0"/>
+              </a:defRPr>
+            </a:lvl4pPr>
+            <a:lvl5pPr eaLnBrk="0" fontAlgn="base" hangingPunct="0">
+              <a:spcBef>
+                <a:spcPct val="0"/>
+              </a:spcBef>
+              <a:spcAft>
+                <a:spcPct val="0"/>
+              </a:spcAft>
+              <a:defRPr>
+                <a:solidFill>
+                  <a:schemeClr val="tx1"/>
+                </a:solidFill>
+                <a:latin typeface="Arial" panose="020B0604020202020204" pitchFamily="34" charset="0"/>
+              </a:defRPr>
+            </a:lvl5pPr>
+            <a:lvl6pPr eaLnBrk="0" fontAlgn="base" hangingPunct="0">
+              <a:spcBef>
+                <a:spcPct val="0"/>
+              </a:spcBef>
+              <a:spcAft>
+                <a:spcPct val="0"/>
+              </a:spcAft>
+              <a:defRPr>
+                <a:solidFill>
+                  <a:schemeClr val="tx1"/>
+                </a:solidFill>
+                <a:latin typeface="Arial" panose="020B0604020202020204" pitchFamily="34" charset="0"/>
+              </a:defRPr>
+            </a:lvl6pPr>
+            <a:lvl7pPr eaLnBrk="0" fontAlgn="base" hangingPunct="0">
+              <a:spcBef>
+                <a:spcPct val="0"/>
+              </a:spcBef>
+              <a:spcAft>
+                <a:spcPct val="0"/>
+              </a:spcAft>
+              <a:defRPr>
+                <a:solidFill>
+                  <a:schemeClr val="tx1"/>
+                </a:solidFill>
+                <a:latin typeface="Arial" panose="020B0604020202020204" pitchFamily="34" charset="0"/>
+              </a:defRPr>
+            </a:lvl7pPr>
+            <a:lvl8pPr eaLnBrk="0" fontAlgn="base" hangingPunct="0">
+              <a:spcBef>
+                <a:spcPct val="0"/>
+              </a:spcBef>
+              <a:spcAft>
+                <a:spcPct val="0"/>
+              </a:spcAft>
+              <a:defRPr>
+                <a:solidFill>
+                  <a:schemeClr val="tx1"/>
+                </a:solidFill>
+                <a:latin typeface="Arial" panose="020B0604020202020204" pitchFamily="34" charset="0"/>
+              </a:defRPr>
+            </a:lvl8pPr>
+            <a:lvl9pPr eaLnBrk="0" fontAlgn="base" hangingPunct="0">
+              <a:spcBef>
+                <a:spcPct val="0"/>
+              </a:spcBef>
+              <a:spcAft>
+                <a:spcPct val="0"/>
+              </a:spcAft>
+              <a:defRPr>
+                <a:solidFill>
+                  <a:schemeClr val="tx1"/>
+                </a:solidFill>
+                <a:latin typeface="Arial" panose="020B0604020202020204" pitchFamily="34" charset="0"/>
+              </a:defRPr>
+            </a:lvl9pPr>
+          </a:lstStyle>
+          <a:p>
+            <a:pPr marL="0" marR="0" lvl="0" indent="0" algn="l" defTabSz="914400" rtl="0" eaLnBrk="0" fontAlgn="base" latinLnBrk="0" hangingPunct="0">
+              <a:lnSpc>
+                <a:spcPct val="100000"/>
+              </a:lnSpc>
+              <a:spcBef>
+                <a:spcPct val="0"/>
+              </a:spcBef>
+              <a:spcAft>
+                <a:spcPct val="0"/>
+              </a:spcAft>
+              <a:buClrTx/>
+              <a:buSzTx/>
+              <a:buFontTx/>
+              <a:buNone/>
+              <a:tabLst/>
+            </a:pPr>
             <a:r>
-              <a:rPr lang="en-US" dirty="0" err="1"/>
-              <a:t>Chainladder</a:t>
+              <a:rPr kumimoji="0" lang="en-US" altLang="en-US" sz="1400" b="0" i="0" u="none" strike="noStrike" cap="none" normalizeH="0" baseline="0" dirty="0">
+                <a:ln>
+                  <a:noFill/>
+                </a:ln>
+                <a:solidFill>
+                  <a:srgbClr val="222832"/>
+                </a:solidFill>
+                <a:effectLst/>
+                <a:latin typeface="Calibri" panose="020F0502020204030204" pitchFamily="34" charset="0"/>
+                <a:cs typeface="Calibri" panose="020F0502020204030204" pitchFamily="34" charset="0"/>
+              </a:rPr>
+              <a:t>1996 Analysis</a:t>
             </a:r>
+          </a:p>
+          <a:p>
+            <a:pPr marL="0" marR="0" lvl="0" indent="0" algn="l" defTabSz="914400" rtl="0" eaLnBrk="0" fontAlgn="base" latinLnBrk="0" hangingPunct="0">
+              <a:lnSpc>
+                <a:spcPct val="100000"/>
+              </a:lnSpc>
+              <a:spcBef>
+                <a:spcPct val="0"/>
+              </a:spcBef>
+              <a:spcAft>
+                <a:spcPct val="0"/>
+              </a:spcAft>
+              <a:buClrTx/>
+              <a:buSzTx/>
+              <a:buFontTx/>
+              <a:buNone/>
+              <a:tabLst/>
+            </a:pPr>
+            <a:endParaRPr lang="en-US" altLang="en-US" sz="1400" dirty="0">
+              <a:solidFill>
+                <a:srgbClr val="222832"/>
+              </a:solidFill>
+              <a:latin typeface="Calibri" panose="020F0502020204030204" pitchFamily="34" charset="0"/>
+              <a:cs typeface="Calibri" panose="020F0502020204030204" pitchFamily="34" charset="0"/>
+            </a:endParaRPr>
+          </a:p>
+          <a:p>
+            <a:pPr marL="0" marR="0" lvl="0" indent="0" algn="l" defTabSz="914400" rtl="0" eaLnBrk="0" fontAlgn="base" latinLnBrk="0" hangingPunct="0">
+              <a:lnSpc>
+                <a:spcPct val="100000"/>
+              </a:lnSpc>
+              <a:spcBef>
+                <a:spcPct val="0"/>
+              </a:spcBef>
+              <a:spcAft>
+                <a:spcPct val="0"/>
+              </a:spcAft>
+              <a:buClrTx/>
+              <a:buSzTx/>
+              <a:buFontTx/>
+              <a:buNone/>
+              <a:tabLst/>
+            </a:pPr>
+            <a:endParaRPr kumimoji="0" lang="en-US" altLang="en-US" sz="1400" b="0" i="0" u="none" strike="noStrike" cap="none" normalizeH="0" baseline="0" dirty="0">
+              <a:ln>
+                <a:noFill/>
+              </a:ln>
+              <a:solidFill>
+                <a:srgbClr val="222832"/>
+              </a:solidFill>
+              <a:effectLst/>
+              <a:latin typeface="Calibri" panose="020F0502020204030204" pitchFamily="34" charset="0"/>
+              <a:cs typeface="Calibri" panose="020F0502020204030204" pitchFamily="34" charset="0"/>
+            </a:endParaRPr>
+          </a:p>
+          <a:p>
+            <a:pPr marL="0" marR="0" lvl="0" indent="0" algn="l" defTabSz="914400" rtl="0" eaLnBrk="0" fontAlgn="base" latinLnBrk="0" hangingPunct="0">
+              <a:lnSpc>
+                <a:spcPct val="100000"/>
+              </a:lnSpc>
+              <a:spcBef>
+                <a:spcPct val="0"/>
+              </a:spcBef>
+              <a:spcAft>
+                <a:spcPct val="0"/>
+              </a:spcAft>
+              <a:buClrTx/>
+              <a:buSzTx/>
+              <a:buFontTx/>
+              <a:buNone/>
+              <a:tabLst/>
+            </a:pPr>
+            <a:endParaRPr kumimoji="0" lang="en-US" altLang="en-US" sz="1400" b="0" i="0" u="none" strike="noStrike" cap="none" normalizeH="0" baseline="0" dirty="0">
+              <a:ln>
+                <a:noFill/>
+              </a:ln>
+              <a:solidFill>
+                <a:srgbClr val="222832"/>
+              </a:solidFill>
+              <a:effectLst/>
+              <a:latin typeface="Calibri" panose="020F0502020204030204" pitchFamily="34" charset="0"/>
+              <a:cs typeface="Calibri" panose="020F0502020204030204" pitchFamily="34" charset="0"/>
+            </a:endParaRPr>
+          </a:p>
+          <a:p>
+            <a:pPr marL="0" marR="0" lvl="0" indent="0" algn="l" defTabSz="914400" rtl="0" eaLnBrk="0" fontAlgn="base" latinLnBrk="0" hangingPunct="0">
+              <a:lnSpc>
+                <a:spcPct val="100000"/>
+              </a:lnSpc>
+              <a:spcBef>
+                <a:spcPct val="0"/>
+              </a:spcBef>
+              <a:spcAft>
+                <a:spcPct val="0"/>
+              </a:spcAft>
+              <a:buClrTx/>
+              <a:buSzTx/>
+              <a:buFontTx/>
+              <a:buNone/>
+              <a:tabLst/>
+            </a:pPr>
+            <a:endParaRPr kumimoji="0" lang="en-US" altLang="en-US" sz="1400" b="0" i="0" u="none" strike="noStrike" cap="none" normalizeH="0" baseline="0" dirty="0">
+              <a:ln>
+                <a:noFill/>
+              </a:ln>
+              <a:solidFill>
+                <a:srgbClr val="222832"/>
+              </a:solidFill>
+              <a:effectLst/>
+              <a:latin typeface="Calibri" panose="020F0502020204030204" pitchFamily="34" charset="0"/>
+              <a:cs typeface="Calibri" panose="020F0502020204030204" pitchFamily="34" charset="0"/>
+            </a:endParaRPr>
+          </a:p>
+          <a:p>
+            <a:pPr marL="0" marR="0" lvl="0" indent="0" algn="l" defTabSz="914400" rtl="0" eaLnBrk="0" fontAlgn="base" latinLnBrk="0" hangingPunct="0">
+              <a:lnSpc>
+                <a:spcPct val="100000"/>
+              </a:lnSpc>
+              <a:spcBef>
+                <a:spcPct val="0"/>
+              </a:spcBef>
+              <a:spcAft>
+                <a:spcPct val="0"/>
+              </a:spcAft>
+              <a:buClrTx/>
+              <a:buSzTx/>
+              <a:buFontTx/>
+              <a:buNone/>
+              <a:tabLst/>
+            </a:pPr>
+            <a:endParaRPr lang="en-US" altLang="en-US" sz="1400" dirty="0">
+              <a:solidFill>
+                <a:srgbClr val="222832"/>
+              </a:solidFill>
+              <a:latin typeface="Calibri" panose="020F0502020204030204" pitchFamily="34" charset="0"/>
+              <a:cs typeface="Calibri" panose="020F0502020204030204" pitchFamily="34" charset="0"/>
+            </a:endParaRPr>
+          </a:p>
+          <a:p>
+            <a:pPr marL="0" marR="0" lvl="0" indent="0" algn="l" defTabSz="914400" rtl="0" eaLnBrk="0" fontAlgn="base" latinLnBrk="0" hangingPunct="0">
+              <a:lnSpc>
+                <a:spcPct val="100000"/>
+              </a:lnSpc>
+              <a:spcBef>
+                <a:spcPct val="0"/>
+              </a:spcBef>
+              <a:spcAft>
+                <a:spcPct val="0"/>
+              </a:spcAft>
+              <a:buClrTx/>
+              <a:buSzTx/>
+              <a:buFontTx/>
+              <a:buNone/>
+              <a:tabLst/>
+            </a:pPr>
             <a:r>
-              <a:rPr lang="en-US" dirty="0"/>
-              <a:t>-python is currently the most popular actuarial-focused open source package as measured by </a:t>
+              <a:rPr kumimoji="0" lang="en-US" altLang="en-US" sz="1400" b="0" i="0" u="none" strike="noStrike" cap="none" normalizeH="0" baseline="0" dirty="0">
+                <a:ln>
+                  <a:noFill/>
+                </a:ln>
+                <a:solidFill>
+                  <a:srgbClr val="222832"/>
+                </a:solidFill>
+                <a:effectLst/>
+                <a:latin typeface="Calibri" panose="020F0502020204030204" pitchFamily="34" charset="0"/>
+                <a:cs typeface="Calibri" panose="020F0502020204030204" pitchFamily="34" charset="0"/>
+              </a:rPr>
+              <a:t>1996 Analysis </a:t>
             </a:r>
+          </a:p>
+          <a:p>
+            <a:pPr marL="0" marR="0" lvl="0" indent="0" algn="l" defTabSz="914400" rtl="0" eaLnBrk="0" fontAlgn="base" latinLnBrk="0" hangingPunct="0">
+              <a:lnSpc>
+                <a:spcPct val="100000"/>
+              </a:lnSpc>
+              <a:spcBef>
+                <a:spcPct val="0"/>
+              </a:spcBef>
+              <a:spcAft>
+                <a:spcPct val="0"/>
+              </a:spcAft>
+              <a:buClrTx/>
+              <a:buSzTx/>
+              <a:buFontTx/>
+              <a:buNone/>
+              <a:tabLst/>
+            </a:pPr>
             <a:r>
-              <a:rPr lang="en-US" dirty="0" err="1"/>
-              <a:t>github</a:t>
+              <a:rPr kumimoji="0" lang="en-US" altLang="en-US" sz="1400" b="0" i="0" u="none" strike="noStrike" cap="none" normalizeH="0" baseline="0" dirty="0">
+                <a:ln>
+                  <a:noFill/>
+                </a:ln>
+                <a:solidFill>
+                  <a:srgbClr val="222832"/>
+                </a:solidFill>
+                <a:effectLst/>
+                <a:latin typeface="Calibri" panose="020F0502020204030204" pitchFamily="34" charset="0"/>
+                <a:cs typeface="Calibri" panose="020F0502020204030204" pitchFamily="34" charset="0"/>
+              </a:rPr>
+              <a:t>using 1997 Diagonal</a:t>
             </a:r>
+          </a:p>
+          <a:p>
+            <a:pPr marL="0" marR="0" lvl="0" indent="0" algn="l" defTabSz="914400" rtl="0" eaLnBrk="0" fontAlgn="base" latinLnBrk="0" hangingPunct="0">
+              <a:lnSpc>
+                <a:spcPct val="100000"/>
+              </a:lnSpc>
+              <a:spcBef>
+                <a:spcPct val="0"/>
+              </a:spcBef>
+              <a:spcAft>
+                <a:spcPct val="0"/>
+              </a:spcAft>
+              <a:buClrTx/>
+              <a:buSzTx/>
+              <a:buFontTx/>
+              <a:buNone/>
+              <a:tabLst/>
+            </a:pPr>
+            <a:endParaRPr lang="en-US" altLang="en-US" sz="1400" dirty="0">
+              <a:solidFill>
+                <a:srgbClr val="222832"/>
+              </a:solidFill>
+              <a:latin typeface="Calibri" panose="020F0502020204030204" pitchFamily="34" charset="0"/>
+              <a:cs typeface="Calibri" panose="020F0502020204030204" pitchFamily="34" charset="0"/>
+            </a:endParaRPr>
+          </a:p>
+          <a:p>
+            <a:pPr marL="0" marR="0" lvl="0" indent="0" algn="l" defTabSz="914400" rtl="0" eaLnBrk="0" fontAlgn="base" latinLnBrk="0" hangingPunct="0">
+              <a:lnSpc>
+                <a:spcPct val="100000"/>
+              </a:lnSpc>
+              <a:spcBef>
+                <a:spcPct val="0"/>
+              </a:spcBef>
+              <a:spcAft>
+                <a:spcPct val="0"/>
+              </a:spcAft>
+              <a:buClrTx/>
+              <a:buSzTx/>
+              <a:buFontTx/>
+              <a:buNone/>
+              <a:tabLst/>
+            </a:pPr>
+            <a:endParaRPr lang="en-US" altLang="en-US" sz="1400" dirty="0">
+              <a:solidFill>
+                <a:srgbClr val="222832"/>
+              </a:solidFill>
+              <a:latin typeface="Calibri" panose="020F0502020204030204" pitchFamily="34" charset="0"/>
+              <a:cs typeface="Calibri" panose="020F0502020204030204" pitchFamily="34" charset="0"/>
+            </a:endParaRPr>
+          </a:p>
+          <a:p>
+            <a:pPr marL="0" marR="0" lvl="0" indent="0" algn="l" defTabSz="914400" rtl="0" eaLnBrk="0" fontAlgn="base" latinLnBrk="0" hangingPunct="0">
+              <a:lnSpc>
+                <a:spcPct val="100000"/>
+              </a:lnSpc>
+              <a:spcBef>
+                <a:spcPct val="0"/>
+              </a:spcBef>
+              <a:spcAft>
+                <a:spcPct val="0"/>
+              </a:spcAft>
+              <a:buClrTx/>
+              <a:buSzTx/>
+              <a:buFontTx/>
+              <a:buNone/>
+              <a:tabLst/>
+            </a:pPr>
+            <a:endParaRPr lang="en-US" altLang="en-US" sz="1400" dirty="0">
+              <a:solidFill>
+                <a:srgbClr val="222832"/>
+              </a:solidFill>
+              <a:latin typeface="Calibri" panose="020F0502020204030204" pitchFamily="34" charset="0"/>
+              <a:cs typeface="Calibri" panose="020F0502020204030204" pitchFamily="34" charset="0"/>
+            </a:endParaRPr>
+          </a:p>
+          <a:p>
+            <a:pPr marL="0" marR="0" lvl="0" indent="0" algn="l" defTabSz="914400" rtl="0" eaLnBrk="0" fontAlgn="base" latinLnBrk="0" hangingPunct="0">
+              <a:lnSpc>
+                <a:spcPct val="100000"/>
+              </a:lnSpc>
+              <a:spcBef>
+                <a:spcPct val="0"/>
+              </a:spcBef>
+              <a:spcAft>
+                <a:spcPct val="0"/>
+              </a:spcAft>
+              <a:buClrTx/>
+              <a:buSzTx/>
+              <a:buFontTx/>
+              <a:buNone/>
+              <a:tabLst/>
+            </a:pPr>
+            <a:endParaRPr lang="en-US" altLang="en-US" sz="1400" dirty="0">
+              <a:solidFill>
+                <a:srgbClr val="222832"/>
+              </a:solidFill>
+              <a:latin typeface="Calibri" panose="020F0502020204030204" pitchFamily="34" charset="0"/>
+              <a:cs typeface="Calibri" panose="020F0502020204030204" pitchFamily="34" charset="0"/>
+            </a:endParaRPr>
+          </a:p>
+          <a:p>
+            <a:pPr marL="0" marR="0" lvl="0" indent="0" algn="l" defTabSz="914400" rtl="0" eaLnBrk="0" fontAlgn="base" latinLnBrk="0" hangingPunct="0">
+              <a:lnSpc>
+                <a:spcPct val="100000"/>
+              </a:lnSpc>
+              <a:spcBef>
+                <a:spcPct val="0"/>
+              </a:spcBef>
+              <a:spcAft>
+                <a:spcPct val="0"/>
+              </a:spcAft>
+              <a:buClrTx/>
+              <a:buSzTx/>
+              <a:buFontTx/>
+              <a:buNone/>
+              <a:tabLst/>
+            </a:pPr>
+            <a:endParaRPr lang="en-US" altLang="en-US" sz="1400" dirty="0">
+              <a:solidFill>
+                <a:srgbClr val="222832"/>
+              </a:solidFill>
+              <a:latin typeface="Calibri" panose="020F0502020204030204" pitchFamily="34" charset="0"/>
+              <a:cs typeface="Calibri" panose="020F0502020204030204" pitchFamily="34" charset="0"/>
+            </a:endParaRPr>
+          </a:p>
+          <a:p>
+            <a:pPr marL="0" marR="0" lvl="0" indent="0" algn="l" defTabSz="914400" rtl="0" eaLnBrk="0" fontAlgn="base" latinLnBrk="0" hangingPunct="0">
+              <a:lnSpc>
+                <a:spcPct val="100000"/>
+              </a:lnSpc>
+              <a:spcBef>
+                <a:spcPct val="0"/>
+              </a:spcBef>
+              <a:spcAft>
+                <a:spcPct val="0"/>
+              </a:spcAft>
+              <a:buClrTx/>
+              <a:buSzTx/>
+              <a:buFontTx/>
+              <a:buNone/>
+              <a:tabLst/>
+            </a:pPr>
             <a:r>
-              <a:rPr lang="en-US" dirty="0"/>
-              <a:t> stars</a:t>
+              <a:rPr kumimoji="0" lang="en-US" altLang="en-US" sz="1400" b="0" i="0" u="none" strike="noStrike" cap="none" normalizeH="0" baseline="0" dirty="0">
+                <a:ln>
+                  <a:noFill/>
+                </a:ln>
+                <a:solidFill>
+                  <a:srgbClr val="222832"/>
+                </a:solidFill>
+                <a:effectLst/>
+                <a:latin typeface="Calibri" panose="020F0502020204030204" pitchFamily="34" charset="0"/>
+                <a:cs typeface="Calibri" panose="020F0502020204030204" pitchFamily="34" charset="0"/>
+              </a:rPr>
+              <a:t>1997 Analysis </a:t>
             </a:r>
+          </a:p>
+          <a:p>
+            <a:pPr marL="0" marR="0" lvl="0" indent="0" algn="l" defTabSz="914400" rtl="0" eaLnBrk="0" fontAlgn="base" latinLnBrk="0" hangingPunct="0">
+              <a:lnSpc>
+                <a:spcPct val="100000"/>
+              </a:lnSpc>
+              <a:spcBef>
+                <a:spcPct val="0"/>
+              </a:spcBef>
+              <a:spcAft>
+                <a:spcPct val="0"/>
+              </a:spcAft>
+              <a:buClrTx/>
+              <a:buSzTx/>
+              <a:buFontTx/>
+              <a:buNone/>
+              <a:tabLst/>
+            </a:pPr>
+            <a:r>
+              <a:rPr kumimoji="0" lang="en-US" altLang="en-US" sz="1400" b="0" i="0" u="none" strike="noStrike" cap="none" normalizeH="0" baseline="0" dirty="0">
+                <a:ln>
+                  <a:noFill/>
+                </a:ln>
+                <a:solidFill>
+                  <a:srgbClr val="222832"/>
+                </a:solidFill>
+                <a:effectLst/>
+                <a:latin typeface="Calibri" panose="020F0502020204030204" pitchFamily="34" charset="0"/>
+                <a:cs typeface="Calibri" panose="020F0502020204030204" pitchFamily="34" charset="0"/>
+              </a:rPr>
+              <a:t>using 1996 selection</a:t>
+            </a:r>
+          </a:p>
+          <a:p>
+            <a:pPr marL="0" marR="0" lvl="0" indent="0" algn="l" defTabSz="914400" rtl="0" eaLnBrk="0" fontAlgn="base" latinLnBrk="0" hangingPunct="0">
+              <a:lnSpc>
+                <a:spcPct val="100000"/>
+              </a:lnSpc>
+              <a:spcBef>
+                <a:spcPct val="0"/>
+              </a:spcBef>
+              <a:spcAft>
+                <a:spcPct val="0"/>
+              </a:spcAft>
+              <a:buClrTx/>
+              <a:buSzTx/>
+              <a:buFontTx/>
+              <a:buNone/>
+              <a:tabLst/>
+            </a:pPr>
+            <a:endParaRPr lang="en-US" altLang="en-US" sz="1400" dirty="0">
+              <a:solidFill>
+                <a:srgbClr val="222832"/>
+              </a:solidFill>
+              <a:latin typeface="Calibri" panose="020F0502020204030204" pitchFamily="34" charset="0"/>
+              <a:cs typeface="Calibri" panose="020F0502020204030204" pitchFamily="34" charset="0"/>
+            </a:endParaRPr>
+          </a:p>
+          <a:p>
+            <a:pPr marL="0" marR="0" lvl="0" indent="0" algn="l" defTabSz="914400" rtl="0" eaLnBrk="0" fontAlgn="base" latinLnBrk="0" hangingPunct="0">
+              <a:lnSpc>
+                <a:spcPct val="100000"/>
+              </a:lnSpc>
+              <a:spcBef>
+                <a:spcPct val="0"/>
+              </a:spcBef>
+              <a:spcAft>
+                <a:spcPct val="0"/>
+              </a:spcAft>
+              <a:buClrTx/>
+              <a:buSzTx/>
+              <a:buFontTx/>
+              <a:buNone/>
+              <a:tabLst/>
+            </a:pPr>
+            <a:endParaRPr lang="en-US" altLang="en-US" sz="1400" dirty="0">
+              <a:solidFill>
+                <a:srgbClr val="222832"/>
+              </a:solidFill>
+              <a:latin typeface="Calibri" panose="020F0502020204030204" pitchFamily="34" charset="0"/>
+              <a:cs typeface="Calibri" panose="020F0502020204030204" pitchFamily="34" charset="0"/>
+            </a:endParaRPr>
+          </a:p>
+          <a:p>
+            <a:pPr marL="0" marR="0" lvl="0" indent="0" algn="l" defTabSz="914400" rtl="0" eaLnBrk="0" fontAlgn="base" latinLnBrk="0" hangingPunct="0">
+              <a:lnSpc>
+                <a:spcPct val="100000"/>
+              </a:lnSpc>
+              <a:spcBef>
+                <a:spcPct val="0"/>
+              </a:spcBef>
+              <a:spcAft>
+                <a:spcPct val="0"/>
+              </a:spcAft>
+              <a:buClrTx/>
+              <a:buSzTx/>
+              <a:buFontTx/>
+              <a:buNone/>
+              <a:tabLst/>
+            </a:pPr>
+            <a:endParaRPr lang="en-US" altLang="en-US" sz="1400" dirty="0">
+              <a:solidFill>
+                <a:srgbClr val="222832"/>
+              </a:solidFill>
+              <a:latin typeface="Calibri" panose="020F0502020204030204" pitchFamily="34" charset="0"/>
+              <a:cs typeface="Calibri" panose="020F0502020204030204" pitchFamily="34" charset="0"/>
+            </a:endParaRPr>
+          </a:p>
+          <a:p>
+            <a:pPr marL="0" marR="0" lvl="0" indent="0" algn="l" defTabSz="914400" rtl="0" eaLnBrk="0" fontAlgn="base" latinLnBrk="0" hangingPunct="0">
+              <a:lnSpc>
+                <a:spcPct val="100000"/>
+              </a:lnSpc>
+              <a:spcBef>
+                <a:spcPct val="0"/>
+              </a:spcBef>
+              <a:spcAft>
+                <a:spcPct val="0"/>
+              </a:spcAft>
+              <a:buClrTx/>
+              <a:buSzTx/>
+              <a:buFontTx/>
+              <a:buNone/>
+              <a:tabLst/>
+            </a:pPr>
+            <a:endParaRPr lang="en-US" altLang="en-US" sz="1400" dirty="0">
+              <a:solidFill>
+                <a:srgbClr val="222832"/>
+              </a:solidFill>
+              <a:latin typeface="Calibri" panose="020F0502020204030204" pitchFamily="34" charset="0"/>
+              <a:cs typeface="Calibri" panose="020F0502020204030204" pitchFamily="34" charset="0"/>
+            </a:endParaRPr>
+          </a:p>
+          <a:p>
+            <a:pPr marL="0" marR="0" lvl="0" indent="0" algn="l" defTabSz="914400" rtl="0" eaLnBrk="0" fontAlgn="base" latinLnBrk="0" hangingPunct="0">
+              <a:lnSpc>
+                <a:spcPct val="100000"/>
+              </a:lnSpc>
+              <a:spcBef>
+                <a:spcPct val="0"/>
+              </a:spcBef>
+              <a:spcAft>
+                <a:spcPct val="0"/>
+              </a:spcAft>
+              <a:buClrTx/>
+              <a:buSzTx/>
+              <a:buFontTx/>
+              <a:buNone/>
+              <a:tabLst/>
+            </a:pPr>
+            <a:endParaRPr lang="en-US" altLang="en-US" sz="1400" dirty="0">
+              <a:solidFill>
+                <a:srgbClr val="222832"/>
+              </a:solidFill>
+              <a:latin typeface="Calibri" panose="020F0502020204030204" pitchFamily="34" charset="0"/>
+              <a:cs typeface="Calibri" panose="020F0502020204030204" pitchFamily="34" charset="0"/>
+            </a:endParaRPr>
+          </a:p>
+          <a:p>
+            <a:pPr marL="0" marR="0" lvl="0" indent="0" algn="l" defTabSz="914400" rtl="0" eaLnBrk="0" fontAlgn="base" latinLnBrk="0" hangingPunct="0">
+              <a:lnSpc>
+                <a:spcPct val="100000"/>
+              </a:lnSpc>
+              <a:spcBef>
+                <a:spcPct val="0"/>
+              </a:spcBef>
+              <a:spcAft>
+                <a:spcPct val="0"/>
+              </a:spcAft>
+              <a:buClrTx/>
+              <a:buSzTx/>
+              <a:buFontTx/>
+              <a:buNone/>
+              <a:tabLst/>
+            </a:pPr>
+            <a:r>
+              <a:rPr kumimoji="0" lang="en-US" altLang="en-US" sz="1400" b="0" i="0" u="none" strike="noStrike" cap="none" normalizeH="0" baseline="0" dirty="0">
+                <a:ln>
+                  <a:noFill/>
+                </a:ln>
+                <a:solidFill>
+                  <a:srgbClr val="222832"/>
+                </a:solidFill>
+                <a:effectLst/>
+                <a:latin typeface="Calibri" panose="020F0502020204030204" pitchFamily="34" charset="0"/>
+                <a:cs typeface="Calibri" panose="020F0502020204030204" pitchFamily="34" charset="0"/>
+              </a:rPr>
+              <a:t>1997 Analysis</a:t>
+            </a:r>
+            <a:endParaRPr kumimoji="0" lang="en-US" altLang="en-US" sz="1400" b="0" i="0" u="none" strike="noStrike" cap="none" normalizeH="0" baseline="0" dirty="0">
+              <a:ln>
+                <a:noFill/>
+              </a:ln>
+              <a:solidFill>
+                <a:schemeClr val="tx1"/>
+              </a:solidFill>
+              <a:effectLst/>
+              <a:latin typeface="Calibri" panose="020F0502020204030204" pitchFamily="34" charset="0"/>
+              <a:cs typeface="Calibri" panose="020F0502020204030204" pitchFamily="34" charset="0"/>
+            </a:endParaRPr>
           </a:p>
         </p:txBody>
       </p:sp>
       <p:sp>
         <p:nvSpPr>
-          <p:cNvPr id="6" name="TextBox 5">
+          <p:cNvPr id="10" name="Right Brace 9">
             <a:extLst>
               <a:ext uri="{FF2B5EF4-FFF2-40B4-BE49-F238E27FC236}">
-                <a16:creationId xmlns:a16="http://schemas.microsoft.com/office/drawing/2014/main" id="{5B33B7CE-1B04-508B-869A-1723989C24DA}"/>
+                <a16:creationId xmlns:a16="http://schemas.microsoft.com/office/drawing/2014/main" id="{5A86FEF7-FB16-42EB-9A6D-C597C4337EFF}"/>
               </a:ext>
             </a:extLst>
           </p:cNvPr>
-          <p:cNvSpPr txBox="1"/>
+          <p:cNvSpPr/>
           <p:nvPr/>
         </p:nvSpPr>
         <p:spPr>
           <a:xfrm>
-            <a:off x="7811343" y="5030509"/>
-            <a:ext cx="4141894" cy="276999"/>
+            <a:off x="5801360" y="1550501"/>
+            <a:ext cx="467360" cy="4738539"/>
           </a:xfrm>
-          <a:prstGeom prst="rect">
+          <a:prstGeom prst="rightBrace">
             <a:avLst/>
           </a:prstGeom>
-          <a:noFill/>
+          <a:ln>
+            <a:solidFill>
+              <a:schemeClr val="tx1"/>
+            </a:solidFill>
+          </a:ln>
         </p:spPr>
+        <p:style>
+          <a:lnRef idx="2">
+            <a:schemeClr val="accent1"/>
+          </a:lnRef>
+          <a:fillRef idx="0">
+            <a:schemeClr val="accent1"/>
+          </a:fillRef>
+          <a:effectRef idx="1">
+            <a:schemeClr val="accent1"/>
+          </a:effectRef>
+          <a:fontRef idx="minor">
+            <a:schemeClr val="tx1"/>
+          </a:fontRef>
+        </p:style>
         <p:txBody>
-          <a:bodyPr wrap="square" rtlCol="0">
-            <a:spAutoFit/>
-          </a:bodyPr>
+          <a:bodyPr rtlCol="0" anchor="ctr"/>
           <a:lstStyle/>
           <a:p>
-            <a:r>
-              <a:rPr lang="en-US" sz="1200" dirty="0"/>
-              <a:t>Source: www.actuarialopensource.com</a:t>
-            </a:r>
+            <a:pPr algn="ctr"/>
+            <a:endParaRPr lang="en-US"/>
           </a:p>
         </p:txBody>
       </p:sp>
     </p:spTree>
     <p:extLst>
       <p:ext uri="{BB962C8B-B14F-4D97-AF65-F5344CB8AC3E}">
-        <p14:creationId xmlns:p14="http://schemas.microsoft.com/office/powerpoint/2010/main" val="1714853590"/>
+        <p14:creationId xmlns:p14="http://schemas.microsoft.com/office/powerpoint/2010/main" val="3217519370"/>
       </p:ext>
     </p:extLst>
   </p:cSld>
@@ -10952,7 +12162,13 @@
   <p:cSld>
     <p:spTree>
       <p:nvGrpSpPr>
-        <p:cNvPr id="1" name=""/>
+        <p:cNvPr id="1" name="">
+          <a:extLst>
+            <a:ext uri="{FF2B5EF4-FFF2-40B4-BE49-F238E27FC236}">
+              <a16:creationId xmlns:a16="http://schemas.microsoft.com/office/drawing/2014/main" id="{812E51B7-5BD1-3C06-1D77-37EB126B5388}"/>
+            </a:ext>
+          </a:extLst>
+        </p:cNvPr>
         <p:cNvGrpSpPr/>
         <p:nvPr/>
       </p:nvGrpSpPr>
@@ -10966,50 +12182,321 @@
       </p:grpSpPr>
       <p:sp>
         <p:nvSpPr>
-          <p:cNvPr id="3" name="TextBox 2">
+          <p:cNvPr id="2" name="Title 1">
             <a:extLst>
               <a:ext uri="{FF2B5EF4-FFF2-40B4-BE49-F238E27FC236}">
-                <a16:creationId xmlns:a16="http://schemas.microsoft.com/office/drawing/2014/main" id="{7D68518F-8E42-624D-9EC6-3FF6BE787A3E}"/>
+                <a16:creationId xmlns:a16="http://schemas.microsoft.com/office/drawing/2014/main" id="{B41E40BE-FC49-5BA0-3729-239BAF4C31E7}"/>
               </a:ext>
             </a:extLst>
           </p:cNvPr>
-          <p:cNvSpPr txBox="1"/>
-          <p:nvPr/>
+          <p:cNvSpPr>
+            <a:spLocks noGrp="1"/>
+          </p:cNvSpPr>
+          <p:nvPr>
+            <p:ph type="title"/>
+          </p:nvPr>
         </p:nvSpPr>
         <p:spPr>
           <a:xfrm>
-            <a:off x="1849119" y="1807048"/>
-            <a:ext cx="7675881" cy="1754326"/>
+            <a:off x="343764" y="-516485"/>
+            <a:ext cx="10303915" cy="1455996"/>
+          </a:xfrm>
+        </p:spPr>
+        <p:txBody>
+          <a:bodyPr vert="horz" lIns="91440" tIns="45720" rIns="91440" bIns="45720" rtlCol="0" anchor="b">
+            <a:normAutofit/>
+          </a:bodyPr>
+          <a:lstStyle/>
+          <a:p>
+            <a:r>
+              <a:rPr lang="en-US" sz="4800" dirty="0">
+                <a:solidFill>
+                  <a:schemeClr val="tx2"/>
+                </a:solidFill>
+              </a:rPr>
+              <a:t>How to quickly explain analysis changes</a:t>
+            </a:r>
+          </a:p>
+        </p:txBody>
+      </p:sp>
+      <p:sp>
+        <p:nvSpPr>
+          <p:cNvPr id="16" name="Rectangle 8">
+            <a:extLst>
+              <a:ext uri="{FF2B5EF4-FFF2-40B4-BE49-F238E27FC236}">
+                <a16:creationId xmlns:a16="http://schemas.microsoft.com/office/drawing/2014/main" id="{1A1C8A88-20F3-A799-DE47-F5C30FCF9137}"/>
+              </a:ext>
+            </a:extLst>
+          </p:cNvPr>
+          <p:cNvSpPr>
+            <a:spLocks noChangeArrowheads="1"/>
+          </p:cNvSpPr>
+          <p:nvPr/>
+        </p:nvSpPr>
+        <p:spPr bwMode="auto">
+          <a:xfrm>
+            <a:off x="7094611" y="1188840"/>
+            <a:ext cx="4091845" cy="1600438"/>
           </a:xfrm>
           <a:prstGeom prst="rect">
             <a:avLst/>
           </a:prstGeom>
           <a:noFill/>
+          <a:ln>
+            <a:noFill/>
+          </a:ln>
+          <a:effectLst/>
+          <a:extLst>
+            <a:ext uri="{909E8E84-426E-40DD-AFC4-6F175D3DCCD1}">
+              <a14:hiddenFill xmlns:a14="http://schemas.microsoft.com/office/drawing/2010/main">
+                <a:solidFill>
+                  <a:schemeClr val="accent1"/>
+                </a:solidFill>
+              </a14:hiddenFill>
+            </a:ext>
+            <a:ext uri="{91240B29-F687-4F45-9708-019B960494DF}">
+              <a14:hiddenLine xmlns:a14="http://schemas.microsoft.com/office/drawing/2010/main" w="9525">
+                <a:solidFill>
+                  <a:schemeClr val="tx1"/>
+                </a:solidFill>
+                <a:miter lim="800000"/>
+                <a:headEnd/>
+                <a:tailEnd/>
+              </a14:hiddenLine>
+            </a:ext>
+            <a:ext uri="{AF507438-7753-43E0-B8FC-AC1667EBCBE1}">
+              <a14:hiddenEffects xmlns:a14="http://schemas.microsoft.com/office/drawing/2010/main">
+                <a:effectLst>
+                  <a:outerShdw dist="35921" dir="2700000" algn="ctr" rotWithShape="0">
+                    <a:schemeClr val="bg2"/>
+                  </a:outerShdw>
+                </a:effectLst>
+              </a14:hiddenEffects>
+            </a:ext>
+          </a:extLst>
         </p:spPr>
         <p:txBody>
-          <a:bodyPr wrap="square">
+          <a:bodyPr vert="horz" wrap="square" lIns="91440" tIns="45720" rIns="91440" bIns="45720" numCol="1" anchor="ctr" anchorCtr="0" compatLnSpc="1">
+            <a:prstTxWarp prst="textNoShape">
+              <a:avLst/>
+            </a:prstTxWarp>
             <a:spAutoFit/>
           </a:bodyPr>
-          <a:lstStyle/>
-          <a:p>
-            <a:pPr algn="l"/>
+          <a:lstStyle>
+            <a:lvl1pPr eaLnBrk="0" fontAlgn="base" hangingPunct="0">
+              <a:spcBef>
+                <a:spcPct val="0"/>
+              </a:spcBef>
+              <a:spcAft>
+                <a:spcPct val="0"/>
+              </a:spcAft>
+              <a:defRPr>
+                <a:solidFill>
+                  <a:schemeClr val="tx1"/>
+                </a:solidFill>
+                <a:latin typeface="Arial" panose="020B0604020202020204" pitchFamily="34" charset="0"/>
+              </a:defRPr>
+            </a:lvl1pPr>
+            <a:lvl2pPr eaLnBrk="0" fontAlgn="base" hangingPunct="0">
+              <a:spcBef>
+                <a:spcPct val="0"/>
+              </a:spcBef>
+              <a:spcAft>
+                <a:spcPct val="0"/>
+              </a:spcAft>
+              <a:defRPr>
+                <a:solidFill>
+                  <a:schemeClr val="tx1"/>
+                </a:solidFill>
+                <a:latin typeface="Arial" panose="020B0604020202020204" pitchFamily="34" charset="0"/>
+              </a:defRPr>
+            </a:lvl2pPr>
+            <a:lvl3pPr eaLnBrk="0" fontAlgn="base" hangingPunct="0">
+              <a:spcBef>
+                <a:spcPct val="0"/>
+              </a:spcBef>
+              <a:spcAft>
+                <a:spcPct val="0"/>
+              </a:spcAft>
+              <a:defRPr>
+                <a:solidFill>
+                  <a:schemeClr val="tx1"/>
+                </a:solidFill>
+                <a:latin typeface="Arial" panose="020B0604020202020204" pitchFamily="34" charset="0"/>
+              </a:defRPr>
+            </a:lvl3pPr>
+            <a:lvl4pPr eaLnBrk="0" fontAlgn="base" hangingPunct="0">
+              <a:spcBef>
+                <a:spcPct val="0"/>
+              </a:spcBef>
+              <a:spcAft>
+                <a:spcPct val="0"/>
+              </a:spcAft>
+              <a:defRPr>
+                <a:solidFill>
+                  <a:schemeClr val="tx1"/>
+                </a:solidFill>
+                <a:latin typeface="Arial" panose="020B0604020202020204" pitchFamily="34" charset="0"/>
+              </a:defRPr>
+            </a:lvl4pPr>
+            <a:lvl5pPr eaLnBrk="0" fontAlgn="base" hangingPunct="0">
+              <a:spcBef>
+                <a:spcPct val="0"/>
+              </a:spcBef>
+              <a:spcAft>
+                <a:spcPct val="0"/>
+              </a:spcAft>
+              <a:defRPr>
+                <a:solidFill>
+                  <a:schemeClr val="tx1"/>
+                </a:solidFill>
+                <a:latin typeface="Arial" panose="020B0604020202020204" pitchFamily="34" charset="0"/>
+              </a:defRPr>
+            </a:lvl5pPr>
+            <a:lvl6pPr eaLnBrk="0" fontAlgn="base" hangingPunct="0">
+              <a:spcBef>
+                <a:spcPct val="0"/>
+              </a:spcBef>
+              <a:spcAft>
+                <a:spcPct val="0"/>
+              </a:spcAft>
+              <a:defRPr>
+                <a:solidFill>
+                  <a:schemeClr val="tx1"/>
+                </a:solidFill>
+                <a:latin typeface="Arial" panose="020B0604020202020204" pitchFamily="34" charset="0"/>
+              </a:defRPr>
+            </a:lvl6pPr>
+            <a:lvl7pPr eaLnBrk="0" fontAlgn="base" hangingPunct="0">
+              <a:spcBef>
+                <a:spcPct val="0"/>
+              </a:spcBef>
+              <a:spcAft>
+                <a:spcPct val="0"/>
+              </a:spcAft>
+              <a:defRPr>
+                <a:solidFill>
+                  <a:schemeClr val="tx1"/>
+                </a:solidFill>
+                <a:latin typeface="Arial" panose="020B0604020202020204" pitchFamily="34" charset="0"/>
+              </a:defRPr>
+            </a:lvl7pPr>
+            <a:lvl8pPr eaLnBrk="0" fontAlgn="base" hangingPunct="0">
+              <a:spcBef>
+                <a:spcPct val="0"/>
+              </a:spcBef>
+              <a:spcAft>
+                <a:spcPct val="0"/>
+              </a:spcAft>
+              <a:defRPr>
+                <a:solidFill>
+                  <a:schemeClr val="tx1"/>
+                </a:solidFill>
+                <a:latin typeface="Arial" panose="020B0604020202020204" pitchFamily="34" charset="0"/>
+              </a:defRPr>
+            </a:lvl8pPr>
+            <a:lvl9pPr eaLnBrk="0" fontAlgn="base" hangingPunct="0">
+              <a:spcBef>
+                <a:spcPct val="0"/>
+              </a:spcBef>
+              <a:spcAft>
+                <a:spcPct val="0"/>
+              </a:spcAft>
+              <a:defRPr>
+                <a:solidFill>
+                  <a:schemeClr val="tx1"/>
+                </a:solidFill>
+                <a:latin typeface="Arial" panose="020B0604020202020204" pitchFamily="34" charset="0"/>
+              </a:defRPr>
+            </a:lvl9pPr>
+          </a:lstStyle>
+          <a:p>
+            <a:pPr marL="0" marR="0" lvl="0" indent="0" algn="l" defTabSz="914400" rtl="0" eaLnBrk="0" fontAlgn="base" latinLnBrk="0" hangingPunct="0">
+              <a:lnSpc>
+                <a:spcPct val="100000"/>
+              </a:lnSpc>
+              <a:spcBef>
+                <a:spcPct val="0"/>
+              </a:spcBef>
+              <a:spcAft>
+                <a:spcPct val="0"/>
+              </a:spcAft>
+              <a:buClrTx/>
+              <a:buSzTx/>
+              <a:buFontTx/>
+              <a:buNone/>
+              <a:tabLst/>
+            </a:pPr>
             <a:r>
-              <a:rPr lang="en-US" b="0" i="0" dirty="0">
+              <a:rPr kumimoji="0" lang="en-US" altLang="en-US" sz="1400" b="0" i="0" u="none" strike="noStrike" cap="none" normalizeH="0" baseline="0" dirty="0">
+                <a:ln>
+                  <a:noFill/>
+                </a:ln>
                 <a:solidFill>
-                  <a:srgbClr val="222222"/>
+                  <a:schemeClr val="tx1"/>
                 </a:solidFill>
                 <a:effectLst/>
                 <a:latin typeface="Calibri" panose="020F0502020204030204" pitchFamily="34" charset="0"/>
                 <a:cs typeface="Calibri" panose="020F0502020204030204" pitchFamily="34" charset="0"/>
               </a:rPr>
-              <a:t>Papers with citation of the package:</a:t>
+              <a:t>The same work process can be handled via a couple of lines of code, leveraging the </a:t>
             </a:r>
-          </a:p>
-          <a:p>
-            <a:pPr algn="l"/>
-            <a:endParaRPr lang="en-US" b="0" i="0" dirty="0">
+            <a:r>
+              <a:rPr kumimoji="0" lang="en-US" altLang="en-US" sz="1400" b="0" i="0" u="none" strike="noStrike" cap="none" normalizeH="0" baseline="0" dirty="0" err="1">
+                <a:ln>
+                  <a:noFill/>
+                </a:ln>
+                <a:solidFill>
+                  <a:schemeClr val="tx1"/>
+                </a:solidFill>
+                <a:effectLst/>
+                <a:latin typeface="Calibri" panose="020F0502020204030204" pitchFamily="34" charset="0"/>
+                <a:cs typeface="Calibri" panose="020F0502020204030204" pitchFamily="34" charset="0"/>
+              </a:rPr>
+              <a:t>scikit</a:t>
+            </a:r>
+            <a:r>
+              <a:rPr kumimoji="0" lang="en-US" altLang="en-US" sz="1400" b="0" i="0" u="none" strike="noStrike" cap="none" normalizeH="0" baseline="0" dirty="0">
+                <a:ln>
+                  <a:noFill/>
+                </a:ln>
+                <a:solidFill>
+                  <a:schemeClr val="tx1"/>
+                </a:solidFill>
+                <a:effectLst/>
+                <a:latin typeface="Calibri" panose="020F0502020204030204" pitchFamily="34" charset="0"/>
+                <a:cs typeface="Calibri" panose="020F0502020204030204" pitchFamily="34" charset="0"/>
+              </a:rPr>
+              <a:t>-learn frame to be able to “Fit” (derived LDF) and “Predict” (calculate ultimate) independently. </a:t>
+            </a:r>
+            <a:endParaRPr lang="en-US" altLang="en-US" sz="1400" dirty="0">
+              <a:latin typeface="Calibri" panose="020F0502020204030204" pitchFamily="34" charset="0"/>
+              <a:cs typeface="Calibri" panose="020F0502020204030204" pitchFamily="34" charset="0"/>
+            </a:endParaRPr>
+          </a:p>
+          <a:p>
+            <a:pPr marL="0" marR="0" lvl="0" indent="0" algn="l" defTabSz="914400" rtl="0" eaLnBrk="0" fontAlgn="base" latinLnBrk="0" hangingPunct="0">
+              <a:lnSpc>
+                <a:spcPct val="100000"/>
+              </a:lnSpc>
+              <a:spcBef>
+                <a:spcPct val="0"/>
+              </a:spcBef>
+              <a:spcAft>
+                <a:spcPct val="0"/>
+              </a:spcAft>
+              <a:buClrTx/>
+              <a:buSzTx/>
+              <a:buFontTx/>
+              <a:buNone/>
+              <a:tabLst/>
+            </a:pPr>
+            <a:endParaRPr kumimoji="0" lang="en-US" altLang="en-US" sz="1400" b="0" i="0" u="none" strike="noStrike" cap="none" normalizeH="0" baseline="0" dirty="0">
+              <a:ln>
+                <a:noFill/>
+              </a:ln>
               <a:solidFill>
-                <a:srgbClr val="222222"/>
+                <a:schemeClr val="tx1"/>
               </a:solidFill>
               <a:effectLst/>
               <a:latin typeface="Calibri" panose="020F0502020204030204" pitchFamily="34" charset="0"/>
@@ -11017,55 +12504,36 @@
             </a:endParaRPr>
           </a:p>
           <a:p>
-            <a:pPr marL="285750" indent="-285750" algn="l">
-              <a:buFont typeface="Arial" panose="020B0604020202020204" pitchFamily="34" charset="0"/>
-              <a:buChar char="•"/>
+            <a:pPr marL="0" marR="0" lvl="0" indent="0" algn="l" defTabSz="914400" rtl="0" eaLnBrk="0" fontAlgn="base" latinLnBrk="0" hangingPunct="0">
+              <a:lnSpc>
+                <a:spcPct val="100000"/>
+              </a:lnSpc>
+              <a:spcBef>
+                <a:spcPct val="0"/>
+              </a:spcBef>
+              <a:spcAft>
+                <a:spcPct val="0"/>
+              </a:spcAft>
+              <a:buClrTx/>
+              <a:buSzTx/>
+              <a:buFontTx/>
+              <a:buNone/>
+              <a:tabLst/>
             </a:pPr>
             <a:r>
-              <a:rPr lang="en-US" dirty="0">
-                <a:highlight>
-                  <a:srgbClr val="FFFFFF"/>
-                </a:highlight>
+              <a:rPr lang="en-US" altLang="en-US" sz="1400" dirty="0">
                 <a:latin typeface="Calibri" panose="020F0502020204030204" pitchFamily="34" charset="0"/>
                 <a:cs typeface="Calibri" panose="020F0502020204030204" pitchFamily="34" charset="0"/>
               </a:rPr>
-              <a:t>The Actuary and IBNR Techniques: A Machine Learning Approach</a:t>
+              <a:t>To extend this process to more methods and segments, just add loops</a:t>
             </a:r>
-          </a:p>
-          <a:p>
-            <a:pPr marL="285750" indent="-285750" algn="l">
-              <a:buFont typeface="Arial" panose="020B0604020202020204" pitchFamily="34" charset="0"/>
-              <a:buChar char="•"/>
-            </a:pPr>
-            <a:r>
-              <a:rPr lang="en-US" b="0" i="0" dirty="0">
-                <a:effectLst/>
-                <a:highlight>
-                  <a:srgbClr val="FFFFFF"/>
-                </a:highlight>
-                <a:latin typeface="Calibri" panose="020F0502020204030204" pitchFamily="34" charset="0"/>
-                <a:cs typeface="Calibri" panose="020F0502020204030204" pitchFamily="34" charset="0"/>
-              </a:rPr>
-              <a:t>Ultimate Loss Reserve Forecasting Using Bidirectional LSTMs</a:t>
-            </a:r>
-          </a:p>
-          <a:p>
-            <a:pPr marL="285750" indent="-285750" algn="l">
-              <a:buFont typeface="Arial" panose="020B0604020202020204" pitchFamily="34" charset="0"/>
-              <a:buChar char="•"/>
-            </a:pPr>
-            <a:r>
-              <a:rPr lang="en-US" b="0" i="0" dirty="0">
-                <a:effectLst/>
-                <a:highlight>
-                  <a:srgbClr val="FFFFFF"/>
-                </a:highlight>
-                <a:latin typeface="Calibri" panose="020F0502020204030204" pitchFamily="34" charset="0"/>
-                <a:cs typeface="Calibri" panose="020F0502020204030204" pitchFamily="34" charset="0"/>
-              </a:rPr>
-              <a:t>Practitioners’ Guide to Building Actuarial Reserving Workflows Using Chain-Ladder Python</a:t>
-            </a:r>
-            <a:endParaRPr lang="en-US" b="0" i="0" dirty="0">
+            <a:endParaRPr kumimoji="0" lang="en-US" altLang="en-US" sz="1400" b="0" i="0" u="none" strike="noStrike" cap="none" normalizeH="0" baseline="0" dirty="0">
+              <a:ln>
+                <a:noFill/>
+              </a:ln>
+              <a:solidFill>
+                <a:schemeClr val="tx1"/>
+              </a:solidFill>
               <a:effectLst/>
               <a:latin typeface="Calibri" panose="020F0502020204030204" pitchFamily="34" charset="0"/>
               <a:cs typeface="Calibri" panose="020F0502020204030204" pitchFamily="34" charset="0"/>
@@ -11073,10 +12541,902 @@
           </a:p>
         </p:txBody>
       </p:sp>
+      <p:pic>
+        <p:nvPicPr>
+          <p:cNvPr id="3" name="Picture 2">
+            <a:extLst>
+              <a:ext uri="{FF2B5EF4-FFF2-40B4-BE49-F238E27FC236}">
+                <a16:creationId xmlns:a16="http://schemas.microsoft.com/office/drawing/2014/main" id="{D7BADC26-4A07-4466-8F12-A849F275B747}"/>
+              </a:ext>
+            </a:extLst>
+          </p:cNvPr>
+          <p:cNvPicPr>
+            <a:picLocks noChangeAspect="1"/>
+          </p:cNvPicPr>
+          <p:nvPr/>
+        </p:nvPicPr>
+        <p:blipFill>
+          <a:blip r:embed="rId2"/>
+          <a:stretch>
+            <a:fillRect/>
+          </a:stretch>
+        </p:blipFill>
+        <p:spPr>
+          <a:xfrm>
+            <a:off x="6537306" y="3230771"/>
+            <a:ext cx="4982934" cy="1820316"/>
+          </a:xfrm>
+          <a:prstGeom prst="rect">
+            <a:avLst/>
+          </a:prstGeom>
+        </p:spPr>
+      </p:pic>
+      <p:sp>
+        <p:nvSpPr>
+          <p:cNvPr id="11" name="Rectangle 8">
+            <a:extLst>
+              <a:ext uri="{FF2B5EF4-FFF2-40B4-BE49-F238E27FC236}">
+                <a16:creationId xmlns:a16="http://schemas.microsoft.com/office/drawing/2014/main" id="{16AD8980-0660-4D6E-B14B-1E3B0D5C00C1}"/>
+              </a:ext>
+            </a:extLst>
+          </p:cNvPr>
+          <p:cNvSpPr>
+            <a:spLocks noChangeArrowheads="1"/>
+          </p:cNvSpPr>
+          <p:nvPr/>
+        </p:nvSpPr>
+        <p:spPr bwMode="auto">
+          <a:xfrm>
+            <a:off x="250494" y="1536362"/>
+            <a:ext cx="4091845" cy="4616648"/>
+          </a:xfrm>
+          <a:prstGeom prst="rect">
+            <a:avLst/>
+          </a:prstGeom>
+          <a:noFill/>
+          <a:ln>
+            <a:noFill/>
+          </a:ln>
+          <a:effectLst/>
+          <a:extLst>
+            <a:ext uri="{909E8E84-426E-40DD-AFC4-6F175D3DCCD1}">
+              <a14:hiddenFill xmlns:a14="http://schemas.microsoft.com/office/drawing/2010/main">
+                <a:solidFill>
+                  <a:schemeClr val="accent1"/>
+                </a:solidFill>
+              </a14:hiddenFill>
+            </a:ext>
+            <a:ext uri="{91240B29-F687-4F45-9708-019B960494DF}">
+              <a14:hiddenLine xmlns:a14="http://schemas.microsoft.com/office/drawing/2010/main" w="9525">
+                <a:solidFill>
+                  <a:schemeClr val="tx1"/>
+                </a:solidFill>
+                <a:miter lim="800000"/>
+                <a:headEnd/>
+                <a:tailEnd/>
+              </a14:hiddenLine>
+            </a:ext>
+            <a:ext uri="{AF507438-7753-43E0-B8FC-AC1667EBCBE1}">
+              <a14:hiddenEffects xmlns:a14="http://schemas.microsoft.com/office/drawing/2010/main">
+                <a:effectLst>
+                  <a:outerShdw dist="35921" dir="2700000" algn="ctr" rotWithShape="0">
+                    <a:schemeClr val="bg2"/>
+                  </a:outerShdw>
+                </a:effectLst>
+              </a14:hiddenEffects>
+            </a:ext>
+          </a:extLst>
+        </p:spPr>
+        <p:txBody>
+          <a:bodyPr vert="horz" wrap="square" lIns="91440" tIns="45720" rIns="91440" bIns="45720" numCol="1" anchor="ctr" anchorCtr="0" compatLnSpc="1">
+            <a:prstTxWarp prst="textNoShape">
+              <a:avLst/>
+            </a:prstTxWarp>
+            <a:spAutoFit/>
+          </a:bodyPr>
+          <a:lstStyle>
+            <a:lvl1pPr eaLnBrk="0" fontAlgn="base" hangingPunct="0">
+              <a:spcBef>
+                <a:spcPct val="0"/>
+              </a:spcBef>
+              <a:spcAft>
+                <a:spcPct val="0"/>
+              </a:spcAft>
+              <a:defRPr>
+                <a:solidFill>
+                  <a:schemeClr val="tx1"/>
+                </a:solidFill>
+                <a:latin typeface="Arial" panose="020B0604020202020204" pitchFamily="34" charset="0"/>
+              </a:defRPr>
+            </a:lvl1pPr>
+            <a:lvl2pPr eaLnBrk="0" fontAlgn="base" hangingPunct="0">
+              <a:spcBef>
+                <a:spcPct val="0"/>
+              </a:spcBef>
+              <a:spcAft>
+                <a:spcPct val="0"/>
+              </a:spcAft>
+              <a:defRPr>
+                <a:solidFill>
+                  <a:schemeClr val="tx1"/>
+                </a:solidFill>
+                <a:latin typeface="Arial" panose="020B0604020202020204" pitchFamily="34" charset="0"/>
+              </a:defRPr>
+            </a:lvl2pPr>
+            <a:lvl3pPr eaLnBrk="0" fontAlgn="base" hangingPunct="0">
+              <a:spcBef>
+                <a:spcPct val="0"/>
+              </a:spcBef>
+              <a:spcAft>
+                <a:spcPct val="0"/>
+              </a:spcAft>
+              <a:defRPr>
+                <a:solidFill>
+                  <a:schemeClr val="tx1"/>
+                </a:solidFill>
+                <a:latin typeface="Arial" panose="020B0604020202020204" pitchFamily="34" charset="0"/>
+              </a:defRPr>
+            </a:lvl3pPr>
+            <a:lvl4pPr eaLnBrk="0" fontAlgn="base" hangingPunct="0">
+              <a:spcBef>
+                <a:spcPct val="0"/>
+              </a:spcBef>
+              <a:spcAft>
+                <a:spcPct val="0"/>
+              </a:spcAft>
+              <a:defRPr>
+                <a:solidFill>
+                  <a:schemeClr val="tx1"/>
+                </a:solidFill>
+                <a:latin typeface="Arial" panose="020B0604020202020204" pitchFamily="34" charset="0"/>
+              </a:defRPr>
+            </a:lvl4pPr>
+            <a:lvl5pPr eaLnBrk="0" fontAlgn="base" hangingPunct="0">
+              <a:spcBef>
+                <a:spcPct val="0"/>
+              </a:spcBef>
+              <a:spcAft>
+                <a:spcPct val="0"/>
+              </a:spcAft>
+              <a:defRPr>
+                <a:solidFill>
+                  <a:schemeClr val="tx1"/>
+                </a:solidFill>
+                <a:latin typeface="Arial" panose="020B0604020202020204" pitchFamily="34" charset="0"/>
+              </a:defRPr>
+            </a:lvl5pPr>
+            <a:lvl6pPr eaLnBrk="0" fontAlgn="base" hangingPunct="0">
+              <a:spcBef>
+                <a:spcPct val="0"/>
+              </a:spcBef>
+              <a:spcAft>
+                <a:spcPct val="0"/>
+              </a:spcAft>
+              <a:defRPr>
+                <a:solidFill>
+                  <a:schemeClr val="tx1"/>
+                </a:solidFill>
+                <a:latin typeface="Arial" panose="020B0604020202020204" pitchFamily="34" charset="0"/>
+              </a:defRPr>
+            </a:lvl6pPr>
+            <a:lvl7pPr eaLnBrk="0" fontAlgn="base" hangingPunct="0">
+              <a:spcBef>
+                <a:spcPct val="0"/>
+              </a:spcBef>
+              <a:spcAft>
+                <a:spcPct val="0"/>
+              </a:spcAft>
+              <a:defRPr>
+                <a:solidFill>
+                  <a:schemeClr val="tx1"/>
+                </a:solidFill>
+                <a:latin typeface="Arial" panose="020B0604020202020204" pitchFamily="34" charset="0"/>
+              </a:defRPr>
+            </a:lvl7pPr>
+            <a:lvl8pPr eaLnBrk="0" fontAlgn="base" hangingPunct="0">
+              <a:spcBef>
+                <a:spcPct val="0"/>
+              </a:spcBef>
+              <a:spcAft>
+                <a:spcPct val="0"/>
+              </a:spcAft>
+              <a:defRPr>
+                <a:solidFill>
+                  <a:schemeClr val="tx1"/>
+                </a:solidFill>
+                <a:latin typeface="Arial" panose="020B0604020202020204" pitchFamily="34" charset="0"/>
+              </a:defRPr>
+            </a:lvl8pPr>
+            <a:lvl9pPr eaLnBrk="0" fontAlgn="base" hangingPunct="0">
+              <a:spcBef>
+                <a:spcPct val="0"/>
+              </a:spcBef>
+              <a:spcAft>
+                <a:spcPct val="0"/>
+              </a:spcAft>
+              <a:defRPr>
+                <a:solidFill>
+                  <a:schemeClr val="tx1"/>
+                </a:solidFill>
+                <a:latin typeface="Arial" panose="020B0604020202020204" pitchFamily="34" charset="0"/>
+              </a:defRPr>
+            </a:lvl9pPr>
+          </a:lstStyle>
+          <a:p>
+            <a:pPr marL="0" marR="0" lvl="0" indent="0" algn="l" defTabSz="914400" rtl="0" eaLnBrk="0" fontAlgn="base" latinLnBrk="0" hangingPunct="0">
+              <a:lnSpc>
+                <a:spcPct val="100000"/>
+              </a:lnSpc>
+              <a:spcBef>
+                <a:spcPct val="0"/>
+              </a:spcBef>
+              <a:spcAft>
+                <a:spcPct val="0"/>
+              </a:spcAft>
+              <a:buClrTx/>
+              <a:buSzTx/>
+              <a:buFontTx/>
+              <a:buNone/>
+              <a:tabLst/>
+            </a:pPr>
+            <a:r>
+              <a:rPr kumimoji="0" lang="en-US" altLang="en-US" sz="1400" b="0" i="0" u="none" strike="noStrike" cap="none" normalizeH="0" baseline="0" dirty="0">
+                <a:ln>
+                  <a:noFill/>
+                </a:ln>
+                <a:solidFill>
+                  <a:srgbClr val="222832"/>
+                </a:solidFill>
+                <a:effectLst/>
+                <a:latin typeface="Calibri" panose="020F0502020204030204" pitchFamily="34" charset="0"/>
+                <a:cs typeface="Calibri" panose="020F0502020204030204" pitchFamily="34" charset="0"/>
+              </a:rPr>
+              <a:t>1996 Analysis</a:t>
+            </a:r>
+          </a:p>
+          <a:p>
+            <a:pPr marL="0" marR="0" lvl="0" indent="0" algn="l" defTabSz="914400" rtl="0" eaLnBrk="0" fontAlgn="base" latinLnBrk="0" hangingPunct="0">
+              <a:lnSpc>
+                <a:spcPct val="100000"/>
+              </a:lnSpc>
+              <a:spcBef>
+                <a:spcPct val="0"/>
+              </a:spcBef>
+              <a:spcAft>
+                <a:spcPct val="0"/>
+              </a:spcAft>
+              <a:buClrTx/>
+              <a:buSzTx/>
+              <a:buFontTx/>
+              <a:buNone/>
+              <a:tabLst/>
+            </a:pPr>
+            <a:endParaRPr lang="en-US" altLang="en-US" sz="1400" dirty="0">
+              <a:solidFill>
+                <a:srgbClr val="222832"/>
+              </a:solidFill>
+              <a:latin typeface="Calibri" panose="020F0502020204030204" pitchFamily="34" charset="0"/>
+              <a:cs typeface="Calibri" panose="020F0502020204030204" pitchFamily="34" charset="0"/>
+            </a:endParaRPr>
+          </a:p>
+          <a:p>
+            <a:pPr marL="0" marR="0" lvl="0" indent="0" algn="l" defTabSz="914400" rtl="0" eaLnBrk="0" fontAlgn="base" latinLnBrk="0" hangingPunct="0">
+              <a:lnSpc>
+                <a:spcPct val="100000"/>
+              </a:lnSpc>
+              <a:spcBef>
+                <a:spcPct val="0"/>
+              </a:spcBef>
+              <a:spcAft>
+                <a:spcPct val="0"/>
+              </a:spcAft>
+              <a:buClrTx/>
+              <a:buSzTx/>
+              <a:buFontTx/>
+              <a:buNone/>
+              <a:tabLst/>
+            </a:pPr>
+            <a:endParaRPr kumimoji="0" lang="en-US" altLang="en-US" sz="1400" b="0" i="0" u="none" strike="noStrike" cap="none" normalizeH="0" baseline="0" dirty="0">
+              <a:ln>
+                <a:noFill/>
+              </a:ln>
+              <a:solidFill>
+                <a:srgbClr val="222832"/>
+              </a:solidFill>
+              <a:effectLst/>
+              <a:latin typeface="Calibri" panose="020F0502020204030204" pitchFamily="34" charset="0"/>
+              <a:cs typeface="Calibri" panose="020F0502020204030204" pitchFamily="34" charset="0"/>
+            </a:endParaRPr>
+          </a:p>
+          <a:p>
+            <a:pPr marL="0" marR="0" lvl="0" indent="0" algn="l" defTabSz="914400" rtl="0" eaLnBrk="0" fontAlgn="base" latinLnBrk="0" hangingPunct="0">
+              <a:lnSpc>
+                <a:spcPct val="100000"/>
+              </a:lnSpc>
+              <a:spcBef>
+                <a:spcPct val="0"/>
+              </a:spcBef>
+              <a:spcAft>
+                <a:spcPct val="0"/>
+              </a:spcAft>
+              <a:buClrTx/>
+              <a:buSzTx/>
+              <a:buFontTx/>
+              <a:buNone/>
+              <a:tabLst/>
+            </a:pPr>
+            <a:endParaRPr kumimoji="0" lang="en-US" altLang="en-US" sz="1400" b="0" i="0" u="none" strike="noStrike" cap="none" normalizeH="0" baseline="0" dirty="0">
+              <a:ln>
+                <a:noFill/>
+              </a:ln>
+              <a:solidFill>
+                <a:srgbClr val="222832"/>
+              </a:solidFill>
+              <a:effectLst/>
+              <a:latin typeface="Calibri" panose="020F0502020204030204" pitchFamily="34" charset="0"/>
+              <a:cs typeface="Calibri" panose="020F0502020204030204" pitchFamily="34" charset="0"/>
+            </a:endParaRPr>
+          </a:p>
+          <a:p>
+            <a:pPr marL="0" marR="0" lvl="0" indent="0" algn="l" defTabSz="914400" rtl="0" eaLnBrk="0" fontAlgn="base" latinLnBrk="0" hangingPunct="0">
+              <a:lnSpc>
+                <a:spcPct val="100000"/>
+              </a:lnSpc>
+              <a:spcBef>
+                <a:spcPct val="0"/>
+              </a:spcBef>
+              <a:spcAft>
+                <a:spcPct val="0"/>
+              </a:spcAft>
+              <a:buClrTx/>
+              <a:buSzTx/>
+              <a:buFontTx/>
+              <a:buNone/>
+              <a:tabLst/>
+            </a:pPr>
+            <a:endParaRPr kumimoji="0" lang="en-US" altLang="en-US" sz="1400" b="0" i="0" u="none" strike="noStrike" cap="none" normalizeH="0" baseline="0" dirty="0">
+              <a:ln>
+                <a:noFill/>
+              </a:ln>
+              <a:solidFill>
+                <a:srgbClr val="222832"/>
+              </a:solidFill>
+              <a:effectLst/>
+              <a:latin typeface="Calibri" panose="020F0502020204030204" pitchFamily="34" charset="0"/>
+              <a:cs typeface="Calibri" panose="020F0502020204030204" pitchFamily="34" charset="0"/>
+            </a:endParaRPr>
+          </a:p>
+          <a:p>
+            <a:pPr marL="0" marR="0" lvl="0" indent="0" algn="l" defTabSz="914400" rtl="0" eaLnBrk="0" fontAlgn="base" latinLnBrk="0" hangingPunct="0">
+              <a:lnSpc>
+                <a:spcPct val="100000"/>
+              </a:lnSpc>
+              <a:spcBef>
+                <a:spcPct val="0"/>
+              </a:spcBef>
+              <a:spcAft>
+                <a:spcPct val="0"/>
+              </a:spcAft>
+              <a:buClrTx/>
+              <a:buSzTx/>
+              <a:buFontTx/>
+              <a:buNone/>
+              <a:tabLst/>
+            </a:pPr>
+            <a:endParaRPr lang="en-US" altLang="en-US" sz="1400" dirty="0">
+              <a:solidFill>
+                <a:srgbClr val="222832"/>
+              </a:solidFill>
+              <a:latin typeface="Calibri" panose="020F0502020204030204" pitchFamily="34" charset="0"/>
+              <a:cs typeface="Calibri" panose="020F0502020204030204" pitchFamily="34" charset="0"/>
+            </a:endParaRPr>
+          </a:p>
+          <a:p>
+            <a:pPr marL="0" marR="0" lvl="0" indent="0" algn="l" defTabSz="914400" rtl="0" eaLnBrk="0" fontAlgn="base" latinLnBrk="0" hangingPunct="0">
+              <a:lnSpc>
+                <a:spcPct val="100000"/>
+              </a:lnSpc>
+              <a:spcBef>
+                <a:spcPct val="0"/>
+              </a:spcBef>
+              <a:spcAft>
+                <a:spcPct val="0"/>
+              </a:spcAft>
+              <a:buClrTx/>
+              <a:buSzTx/>
+              <a:buFontTx/>
+              <a:buNone/>
+              <a:tabLst/>
+            </a:pPr>
+            <a:r>
+              <a:rPr kumimoji="0" lang="en-US" altLang="en-US" sz="1400" b="0" i="0" u="none" strike="noStrike" cap="none" normalizeH="0" baseline="0" dirty="0">
+                <a:ln>
+                  <a:noFill/>
+                </a:ln>
+                <a:solidFill>
+                  <a:srgbClr val="222832"/>
+                </a:solidFill>
+                <a:effectLst/>
+                <a:latin typeface="Calibri" panose="020F0502020204030204" pitchFamily="34" charset="0"/>
+                <a:cs typeface="Calibri" panose="020F0502020204030204" pitchFamily="34" charset="0"/>
+              </a:rPr>
+              <a:t>1996 Analysis </a:t>
+            </a:r>
+          </a:p>
+          <a:p>
+            <a:pPr marL="0" marR="0" lvl="0" indent="0" algn="l" defTabSz="914400" rtl="0" eaLnBrk="0" fontAlgn="base" latinLnBrk="0" hangingPunct="0">
+              <a:lnSpc>
+                <a:spcPct val="100000"/>
+              </a:lnSpc>
+              <a:spcBef>
+                <a:spcPct val="0"/>
+              </a:spcBef>
+              <a:spcAft>
+                <a:spcPct val="0"/>
+              </a:spcAft>
+              <a:buClrTx/>
+              <a:buSzTx/>
+              <a:buFontTx/>
+              <a:buNone/>
+              <a:tabLst/>
+            </a:pPr>
+            <a:r>
+              <a:rPr kumimoji="0" lang="en-US" altLang="en-US" sz="1400" b="0" i="0" u="none" strike="noStrike" cap="none" normalizeH="0" baseline="0" dirty="0">
+                <a:ln>
+                  <a:noFill/>
+                </a:ln>
+                <a:solidFill>
+                  <a:srgbClr val="222832"/>
+                </a:solidFill>
+                <a:effectLst/>
+                <a:latin typeface="Calibri" panose="020F0502020204030204" pitchFamily="34" charset="0"/>
+                <a:cs typeface="Calibri" panose="020F0502020204030204" pitchFamily="34" charset="0"/>
+              </a:rPr>
+              <a:t>using 1997 Diagonal</a:t>
+            </a:r>
+          </a:p>
+          <a:p>
+            <a:pPr marL="0" marR="0" lvl="0" indent="0" algn="l" defTabSz="914400" rtl="0" eaLnBrk="0" fontAlgn="base" latinLnBrk="0" hangingPunct="0">
+              <a:lnSpc>
+                <a:spcPct val="100000"/>
+              </a:lnSpc>
+              <a:spcBef>
+                <a:spcPct val="0"/>
+              </a:spcBef>
+              <a:spcAft>
+                <a:spcPct val="0"/>
+              </a:spcAft>
+              <a:buClrTx/>
+              <a:buSzTx/>
+              <a:buFontTx/>
+              <a:buNone/>
+              <a:tabLst/>
+            </a:pPr>
+            <a:endParaRPr lang="en-US" altLang="en-US" sz="1400" dirty="0">
+              <a:solidFill>
+                <a:srgbClr val="222832"/>
+              </a:solidFill>
+              <a:latin typeface="Calibri" panose="020F0502020204030204" pitchFamily="34" charset="0"/>
+              <a:cs typeface="Calibri" panose="020F0502020204030204" pitchFamily="34" charset="0"/>
+            </a:endParaRPr>
+          </a:p>
+          <a:p>
+            <a:pPr marL="0" marR="0" lvl="0" indent="0" algn="l" defTabSz="914400" rtl="0" eaLnBrk="0" fontAlgn="base" latinLnBrk="0" hangingPunct="0">
+              <a:lnSpc>
+                <a:spcPct val="100000"/>
+              </a:lnSpc>
+              <a:spcBef>
+                <a:spcPct val="0"/>
+              </a:spcBef>
+              <a:spcAft>
+                <a:spcPct val="0"/>
+              </a:spcAft>
+              <a:buClrTx/>
+              <a:buSzTx/>
+              <a:buFontTx/>
+              <a:buNone/>
+              <a:tabLst/>
+            </a:pPr>
+            <a:endParaRPr lang="en-US" altLang="en-US" sz="1400" dirty="0">
+              <a:solidFill>
+                <a:srgbClr val="222832"/>
+              </a:solidFill>
+              <a:latin typeface="Calibri" panose="020F0502020204030204" pitchFamily="34" charset="0"/>
+              <a:cs typeface="Calibri" panose="020F0502020204030204" pitchFamily="34" charset="0"/>
+            </a:endParaRPr>
+          </a:p>
+          <a:p>
+            <a:pPr marL="0" marR="0" lvl="0" indent="0" algn="l" defTabSz="914400" rtl="0" eaLnBrk="0" fontAlgn="base" latinLnBrk="0" hangingPunct="0">
+              <a:lnSpc>
+                <a:spcPct val="100000"/>
+              </a:lnSpc>
+              <a:spcBef>
+                <a:spcPct val="0"/>
+              </a:spcBef>
+              <a:spcAft>
+                <a:spcPct val="0"/>
+              </a:spcAft>
+              <a:buClrTx/>
+              <a:buSzTx/>
+              <a:buFontTx/>
+              <a:buNone/>
+              <a:tabLst/>
+            </a:pPr>
+            <a:endParaRPr lang="en-US" altLang="en-US" sz="1400" dirty="0">
+              <a:solidFill>
+                <a:srgbClr val="222832"/>
+              </a:solidFill>
+              <a:latin typeface="Calibri" panose="020F0502020204030204" pitchFamily="34" charset="0"/>
+              <a:cs typeface="Calibri" panose="020F0502020204030204" pitchFamily="34" charset="0"/>
+            </a:endParaRPr>
+          </a:p>
+          <a:p>
+            <a:pPr marL="0" marR="0" lvl="0" indent="0" algn="l" defTabSz="914400" rtl="0" eaLnBrk="0" fontAlgn="base" latinLnBrk="0" hangingPunct="0">
+              <a:lnSpc>
+                <a:spcPct val="100000"/>
+              </a:lnSpc>
+              <a:spcBef>
+                <a:spcPct val="0"/>
+              </a:spcBef>
+              <a:spcAft>
+                <a:spcPct val="0"/>
+              </a:spcAft>
+              <a:buClrTx/>
+              <a:buSzTx/>
+              <a:buFontTx/>
+              <a:buNone/>
+              <a:tabLst/>
+            </a:pPr>
+            <a:endParaRPr lang="en-US" altLang="en-US" sz="1400" dirty="0">
+              <a:solidFill>
+                <a:srgbClr val="222832"/>
+              </a:solidFill>
+              <a:latin typeface="Calibri" panose="020F0502020204030204" pitchFamily="34" charset="0"/>
+              <a:cs typeface="Calibri" panose="020F0502020204030204" pitchFamily="34" charset="0"/>
+            </a:endParaRPr>
+          </a:p>
+          <a:p>
+            <a:pPr marL="0" marR="0" lvl="0" indent="0" algn="l" defTabSz="914400" rtl="0" eaLnBrk="0" fontAlgn="base" latinLnBrk="0" hangingPunct="0">
+              <a:lnSpc>
+                <a:spcPct val="100000"/>
+              </a:lnSpc>
+              <a:spcBef>
+                <a:spcPct val="0"/>
+              </a:spcBef>
+              <a:spcAft>
+                <a:spcPct val="0"/>
+              </a:spcAft>
+              <a:buClrTx/>
+              <a:buSzTx/>
+              <a:buFontTx/>
+              <a:buNone/>
+              <a:tabLst/>
+            </a:pPr>
+            <a:endParaRPr lang="en-US" altLang="en-US" sz="1400" dirty="0">
+              <a:solidFill>
+                <a:srgbClr val="222832"/>
+              </a:solidFill>
+              <a:latin typeface="Calibri" panose="020F0502020204030204" pitchFamily="34" charset="0"/>
+              <a:cs typeface="Calibri" panose="020F0502020204030204" pitchFamily="34" charset="0"/>
+            </a:endParaRPr>
+          </a:p>
+          <a:p>
+            <a:pPr marL="0" marR="0" lvl="0" indent="0" algn="l" defTabSz="914400" rtl="0" eaLnBrk="0" fontAlgn="base" latinLnBrk="0" hangingPunct="0">
+              <a:lnSpc>
+                <a:spcPct val="100000"/>
+              </a:lnSpc>
+              <a:spcBef>
+                <a:spcPct val="0"/>
+              </a:spcBef>
+              <a:spcAft>
+                <a:spcPct val="0"/>
+              </a:spcAft>
+              <a:buClrTx/>
+              <a:buSzTx/>
+              <a:buFontTx/>
+              <a:buNone/>
+              <a:tabLst/>
+            </a:pPr>
+            <a:r>
+              <a:rPr kumimoji="0" lang="en-US" altLang="en-US" sz="1400" b="0" i="0" u="none" strike="noStrike" cap="none" normalizeH="0" baseline="0" dirty="0">
+                <a:ln>
+                  <a:noFill/>
+                </a:ln>
+                <a:solidFill>
+                  <a:srgbClr val="222832"/>
+                </a:solidFill>
+                <a:effectLst/>
+                <a:latin typeface="Calibri" panose="020F0502020204030204" pitchFamily="34" charset="0"/>
+                <a:cs typeface="Calibri" panose="020F0502020204030204" pitchFamily="34" charset="0"/>
+              </a:rPr>
+              <a:t>1997 Analysis </a:t>
+            </a:r>
+          </a:p>
+          <a:p>
+            <a:pPr marL="0" marR="0" lvl="0" indent="0" algn="l" defTabSz="914400" rtl="0" eaLnBrk="0" fontAlgn="base" latinLnBrk="0" hangingPunct="0">
+              <a:lnSpc>
+                <a:spcPct val="100000"/>
+              </a:lnSpc>
+              <a:spcBef>
+                <a:spcPct val="0"/>
+              </a:spcBef>
+              <a:spcAft>
+                <a:spcPct val="0"/>
+              </a:spcAft>
+              <a:buClrTx/>
+              <a:buSzTx/>
+              <a:buFontTx/>
+              <a:buNone/>
+              <a:tabLst/>
+            </a:pPr>
+            <a:r>
+              <a:rPr kumimoji="0" lang="en-US" altLang="en-US" sz="1400" b="0" i="0" u="none" strike="noStrike" cap="none" normalizeH="0" baseline="0" dirty="0">
+                <a:ln>
+                  <a:noFill/>
+                </a:ln>
+                <a:solidFill>
+                  <a:srgbClr val="222832"/>
+                </a:solidFill>
+                <a:effectLst/>
+                <a:latin typeface="Calibri" panose="020F0502020204030204" pitchFamily="34" charset="0"/>
+                <a:cs typeface="Calibri" panose="020F0502020204030204" pitchFamily="34" charset="0"/>
+              </a:rPr>
+              <a:t>using 1996 selection</a:t>
+            </a:r>
+          </a:p>
+          <a:p>
+            <a:pPr marL="0" marR="0" lvl="0" indent="0" algn="l" defTabSz="914400" rtl="0" eaLnBrk="0" fontAlgn="base" latinLnBrk="0" hangingPunct="0">
+              <a:lnSpc>
+                <a:spcPct val="100000"/>
+              </a:lnSpc>
+              <a:spcBef>
+                <a:spcPct val="0"/>
+              </a:spcBef>
+              <a:spcAft>
+                <a:spcPct val="0"/>
+              </a:spcAft>
+              <a:buClrTx/>
+              <a:buSzTx/>
+              <a:buFontTx/>
+              <a:buNone/>
+              <a:tabLst/>
+            </a:pPr>
+            <a:endParaRPr lang="en-US" altLang="en-US" sz="1400" dirty="0">
+              <a:solidFill>
+                <a:srgbClr val="222832"/>
+              </a:solidFill>
+              <a:latin typeface="Calibri" panose="020F0502020204030204" pitchFamily="34" charset="0"/>
+              <a:cs typeface="Calibri" panose="020F0502020204030204" pitchFamily="34" charset="0"/>
+            </a:endParaRPr>
+          </a:p>
+          <a:p>
+            <a:pPr marL="0" marR="0" lvl="0" indent="0" algn="l" defTabSz="914400" rtl="0" eaLnBrk="0" fontAlgn="base" latinLnBrk="0" hangingPunct="0">
+              <a:lnSpc>
+                <a:spcPct val="100000"/>
+              </a:lnSpc>
+              <a:spcBef>
+                <a:spcPct val="0"/>
+              </a:spcBef>
+              <a:spcAft>
+                <a:spcPct val="0"/>
+              </a:spcAft>
+              <a:buClrTx/>
+              <a:buSzTx/>
+              <a:buFontTx/>
+              <a:buNone/>
+              <a:tabLst/>
+            </a:pPr>
+            <a:endParaRPr lang="en-US" altLang="en-US" sz="1400" dirty="0">
+              <a:solidFill>
+                <a:srgbClr val="222832"/>
+              </a:solidFill>
+              <a:latin typeface="Calibri" panose="020F0502020204030204" pitchFamily="34" charset="0"/>
+              <a:cs typeface="Calibri" panose="020F0502020204030204" pitchFamily="34" charset="0"/>
+            </a:endParaRPr>
+          </a:p>
+          <a:p>
+            <a:pPr marL="0" marR="0" lvl="0" indent="0" algn="l" defTabSz="914400" rtl="0" eaLnBrk="0" fontAlgn="base" latinLnBrk="0" hangingPunct="0">
+              <a:lnSpc>
+                <a:spcPct val="100000"/>
+              </a:lnSpc>
+              <a:spcBef>
+                <a:spcPct val="0"/>
+              </a:spcBef>
+              <a:spcAft>
+                <a:spcPct val="0"/>
+              </a:spcAft>
+              <a:buClrTx/>
+              <a:buSzTx/>
+              <a:buFontTx/>
+              <a:buNone/>
+              <a:tabLst/>
+            </a:pPr>
+            <a:endParaRPr lang="en-US" altLang="en-US" sz="1400" dirty="0">
+              <a:solidFill>
+                <a:srgbClr val="222832"/>
+              </a:solidFill>
+              <a:latin typeface="Calibri" panose="020F0502020204030204" pitchFamily="34" charset="0"/>
+              <a:cs typeface="Calibri" panose="020F0502020204030204" pitchFamily="34" charset="0"/>
+            </a:endParaRPr>
+          </a:p>
+          <a:p>
+            <a:pPr marL="0" marR="0" lvl="0" indent="0" algn="l" defTabSz="914400" rtl="0" eaLnBrk="0" fontAlgn="base" latinLnBrk="0" hangingPunct="0">
+              <a:lnSpc>
+                <a:spcPct val="100000"/>
+              </a:lnSpc>
+              <a:spcBef>
+                <a:spcPct val="0"/>
+              </a:spcBef>
+              <a:spcAft>
+                <a:spcPct val="0"/>
+              </a:spcAft>
+              <a:buClrTx/>
+              <a:buSzTx/>
+              <a:buFontTx/>
+              <a:buNone/>
+              <a:tabLst/>
+            </a:pPr>
+            <a:endParaRPr lang="en-US" altLang="en-US" sz="1400" dirty="0">
+              <a:solidFill>
+                <a:srgbClr val="222832"/>
+              </a:solidFill>
+              <a:latin typeface="Calibri" panose="020F0502020204030204" pitchFamily="34" charset="0"/>
+              <a:cs typeface="Calibri" panose="020F0502020204030204" pitchFamily="34" charset="0"/>
+            </a:endParaRPr>
+          </a:p>
+          <a:p>
+            <a:pPr marL="0" marR="0" lvl="0" indent="0" algn="l" defTabSz="914400" rtl="0" eaLnBrk="0" fontAlgn="base" latinLnBrk="0" hangingPunct="0">
+              <a:lnSpc>
+                <a:spcPct val="100000"/>
+              </a:lnSpc>
+              <a:spcBef>
+                <a:spcPct val="0"/>
+              </a:spcBef>
+              <a:spcAft>
+                <a:spcPct val="0"/>
+              </a:spcAft>
+              <a:buClrTx/>
+              <a:buSzTx/>
+              <a:buFontTx/>
+              <a:buNone/>
+              <a:tabLst/>
+            </a:pPr>
+            <a:endParaRPr lang="en-US" altLang="en-US" sz="1400" dirty="0">
+              <a:solidFill>
+                <a:srgbClr val="222832"/>
+              </a:solidFill>
+              <a:latin typeface="Calibri" panose="020F0502020204030204" pitchFamily="34" charset="0"/>
+              <a:cs typeface="Calibri" panose="020F0502020204030204" pitchFamily="34" charset="0"/>
+            </a:endParaRPr>
+          </a:p>
+          <a:p>
+            <a:pPr marL="0" marR="0" lvl="0" indent="0" algn="l" defTabSz="914400" rtl="0" eaLnBrk="0" fontAlgn="base" latinLnBrk="0" hangingPunct="0">
+              <a:lnSpc>
+                <a:spcPct val="100000"/>
+              </a:lnSpc>
+              <a:spcBef>
+                <a:spcPct val="0"/>
+              </a:spcBef>
+              <a:spcAft>
+                <a:spcPct val="0"/>
+              </a:spcAft>
+              <a:buClrTx/>
+              <a:buSzTx/>
+              <a:buFontTx/>
+              <a:buNone/>
+              <a:tabLst/>
+            </a:pPr>
+            <a:r>
+              <a:rPr kumimoji="0" lang="en-US" altLang="en-US" sz="1400" b="0" i="0" u="none" strike="noStrike" cap="none" normalizeH="0" baseline="0" dirty="0">
+                <a:ln>
+                  <a:noFill/>
+                </a:ln>
+                <a:solidFill>
+                  <a:srgbClr val="222832"/>
+                </a:solidFill>
+                <a:effectLst/>
+                <a:latin typeface="Calibri" panose="020F0502020204030204" pitchFamily="34" charset="0"/>
+                <a:cs typeface="Calibri" panose="020F0502020204030204" pitchFamily="34" charset="0"/>
+              </a:rPr>
+              <a:t>1997 Analysis</a:t>
+            </a:r>
+            <a:endParaRPr kumimoji="0" lang="en-US" altLang="en-US" sz="1400" b="0" i="0" u="none" strike="noStrike" cap="none" normalizeH="0" baseline="0" dirty="0">
+              <a:ln>
+                <a:noFill/>
+              </a:ln>
+              <a:solidFill>
+                <a:schemeClr val="tx1"/>
+              </a:solidFill>
+              <a:effectLst/>
+              <a:latin typeface="Calibri" panose="020F0502020204030204" pitchFamily="34" charset="0"/>
+              <a:cs typeface="Calibri" panose="020F0502020204030204" pitchFamily="34" charset="0"/>
+            </a:endParaRPr>
+          </a:p>
+        </p:txBody>
+      </p:sp>
+      <p:sp>
+        <p:nvSpPr>
+          <p:cNvPr id="10" name="Right Brace 9">
+            <a:extLst>
+              <a:ext uri="{FF2B5EF4-FFF2-40B4-BE49-F238E27FC236}">
+                <a16:creationId xmlns:a16="http://schemas.microsoft.com/office/drawing/2014/main" id="{5A86FEF7-FB16-42EB-9A6D-C597C4337EFF}"/>
+              </a:ext>
+            </a:extLst>
+          </p:cNvPr>
+          <p:cNvSpPr/>
+          <p:nvPr/>
+        </p:nvSpPr>
+        <p:spPr>
+          <a:xfrm>
+            <a:off x="5801360" y="1550501"/>
+            <a:ext cx="467360" cy="4738539"/>
+          </a:xfrm>
+          <a:prstGeom prst="rightBrace">
+            <a:avLst/>
+          </a:prstGeom>
+          <a:ln>
+            <a:solidFill>
+              <a:schemeClr val="tx1"/>
+            </a:solidFill>
+          </a:ln>
+        </p:spPr>
+        <p:style>
+          <a:lnRef idx="2">
+            <a:schemeClr val="accent1"/>
+          </a:lnRef>
+          <a:fillRef idx="0">
+            <a:schemeClr val="accent1"/>
+          </a:fillRef>
+          <a:effectRef idx="1">
+            <a:schemeClr val="accent1"/>
+          </a:effectRef>
+          <a:fontRef idx="minor">
+            <a:schemeClr val="tx1"/>
+          </a:fontRef>
+        </p:style>
+        <p:txBody>
+          <a:bodyPr rtlCol="0" anchor="ctr"/>
+          <a:lstStyle/>
+          <a:p>
+            <a:pPr algn="ctr"/>
+            <a:endParaRPr lang="en-US"/>
+          </a:p>
+        </p:txBody>
+      </p:sp>
+      <p:pic>
+        <p:nvPicPr>
+          <p:cNvPr id="4" name="Picture 3">
+            <a:extLst>
+              <a:ext uri="{FF2B5EF4-FFF2-40B4-BE49-F238E27FC236}">
+                <a16:creationId xmlns:a16="http://schemas.microsoft.com/office/drawing/2014/main" id="{02B89E19-AED7-4D8C-9482-E382ED24DB74}"/>
+              </a:ext>
+            </a:extLst>
+          </p:cNvPr>
+          <p:cNvPicPr>
+            <a:picLocks noChangeAspect="1"/>
+          </p:cNvPicPr>
+          <p:nvPr/>
+        </p:nvPicPr>
+        <p:blipFill>
+          <a:blip r:embed="rId3"/>
+          <a:stretch>
+            <a:fillRect/>
+          </a:stretch>
+        </p:blipFill>
+        <p:spPr>
+          <a:xfrm>
+            <a:off x="1840865" y="939511"/>
+            <a:ext cx="3691909" cy="5381625"/>
+          </a:xfrm>
+          <a:prstGeom prst="rect">
+            <a:avLst/>
+          </a:prstGeom>
+        </p:spPr>
+      </p:pic>
     </p:spTree>
     <p:extLst>
       <p:ext uri="{BB962C8B-B14F-4D97-AF65-F5344CB8AC3E}">
-        <p14:creationId xmlns:p14="http://schemas.microsoft.com/office/powerpoint/2010/main" val="1249469721"/>
+        <p14:creationId xmlns:p14="http://schemas.microsoft.com/office/powerpoint/2010/main" val="95457264"/>
       </p:ext>
     </p:extLst>
   </p:cSld>
@@ -11310,6 +13670,287 @@
     <p:extLst>
       <p:ext uri="{BB962C8B-B14F-4D97-AF65-F5344CB8AC3E}">
         <p14:creationId xmlns:p14="http://schemas.microsoft.com/office/powerpoint/2010/main" val="496773234"/>
+      </p:ext>
+    </p:extLst>
+  </p:cSld>
+  <p:clrMapOvr>
+    <a:masterClrMapping/>
+  </p:clrMapOvr>
+</p:sld>
+</file>
+
+<file path=ppt/slides/slide20.xml><?xml version="1.0" encoding="utf-8"?>
+<p:sld xmlns:a="http://schemas.openxmlformats.org/drawingml/2006/main" xmlns:r="http://schemas.openxmlformats.org/officeDocument/2006/relationships" xmlns:p="http://schemas.openxmlformats.org/presentationml/2006/main">
+  <p:cSld>
+    <p:spTree>
+      <p:nvGrpSpPr>
+        <p:cNvPr id="1" name=""/>
+        <p:cNvGrpSpPr/>
+        <p:nvPr/>
+      </p:nvGrpSpPr>
+      <p:grpSpPr>
+        <a:xfrm>
+          <a:off x="0" y="0"/>
+          <a:ext cx="0" cy="0"/>
+          <a:chOff x="0" y="0"/>
+          <a:chExt cx="0" cy="0"/>
+        </a:xfrm>
+      </p:grpSpPr>
+      <p:pic>
+        <p:nvPicPr>
+          <p:cNvPr id="4" name="Picture 3">
+            <a:extLst>
+              <a:ext uri="{FF2B5EF4-FFF2-40B4-BE49-F238E27FC236}">
+                <a16:creationId xmlns:a16="http://schemas.microsoft.com/office/drawing/2014/main" id="{7AF334B1-B273-D0DA-BE07-F29ACFC02334}"/>
+              </a:ext>
+            </a:extLst>
+          </p:cNvPr>
+          <p:cNvPicPr>
+            <a:picLocks noChangeAspect="1"/>
+          </p:cNvPicPr>
+          <p:nvPr/>
+        </p:nvPicPr>
+        <p:blipFill>
+          <a:blip r:embed="rId2"/>
+          <a:stretch>
+            <a:fillRect/>
+          </a:stretch>
+        </p:blipFill>
+        <p:spPr>
+          <a:xfrm>
+            <a:off x="584664" y="279258"/>
+            <a:ext cx="10159851" cy="4965809"/>
+          </a:xfrm>
+          <a:prstGeom prst="rect">
+            <a:avLst/>
+          </a:prstGeom>
+        </p:spPr>
+      </p:pic>
+      <p:sp>
+        <p:nvSpPr>
+          <p:cNvPr id="5" name="TextBox 4">
+            <a:extLst>
+              <a:ext uri="{FF2B5EF4-FFF2-40B4-BE49-F238E27FC236}">
+                <a16:creationId xmlns:a16="http://schemas.microsoft.com/office/drawing/2014/main" id="{6B6CCA69-2AED-14B9-7822-7FEC702DEBF3}"/>
+              </a:ext>
+            </a:extLst>
+          </p:cNvPr>
+          <p:cNvSpPr txBox="1"/>
+          <p:nvPr/>
+        </p:nvSpPr>
+        <p:spPr>
+          <a:xfrm>
+            <a:off x="792482" y="5536013"/>
+            <a:ext cx="10430932" cy="646331"/>
+          </a:xfrm>
+          <a:prstGeom prst="rect">
+            <a:avLst/>
+          </a:prstGeom>
+          <a:noFill/>
+        </p:spPr>
+        <p:txBody>
+          <a:bodyPr wrap="square" rtlCol="0">
+            <a:spAutoFit/>
+          </a:bodyPr>
+          <a:lstStyle/>
+          <a:p>
+            <a:r>
+              <a:rPr lang="en-US" dirty="0" err="1"/>
+              <a:t>Chainladder</a:t>
+            </a:r>
+            <a:r>
+              <a:rPr lang="en-US" dirty="0"/>
+              <a:t>-python is currently the most popular actuarial-focused open source package as measured by </a:t>
+            </a:r>
+            <a:r>
+              <a:rPr lang="en-US" dirty="0" err="1"/>
+              <a:t>github</a:t>
+            </a:r>
+            <a:r>
+              <a:rPr lang="en-US" dirty="0"/>
+              <a:t> stars</a:t>
+            </a:r>
+          </a:p>
+        </p:txBody>
+      </p:sp>
+      <p:sp>
+        <p:nvSpPr>
+          <p:cNvPr id="6" name="TextBox 5">
+            <a:extLst>
+              <a:ext uri="{FF2B5EF4-FFF2-40B4-BE49-F238E27FC236}">
+                <a16:creationId xmlns:a16="http://schemas.microsoft.com/office/drawing/2014/main" id="{5B33B7CE-1B04-508B-869A-1723989C24DA}"/>
+              </a:ext>
+            </a:extLst>
+          </p:cNvPr>
+          <p:cNvSpPr txBox="1"/>
+          <p:nvPr/>
+        </p:nvSpPr>
+        <p:spPr>
+          <a:xfrm>
+            <a:off x="7811343" y="5030509"/>
+            <a:ext cx="4141894" cy="276999"/>
+          </a:xfrm>
+          <a:prstGeom prst="rect">
+            <a:avLst/>
+          </a:prstGeom>
+          <a:noFill/>
+        </p:spPr>
+        <p:txBody>
+          <a:bodyPr wrap="square" rtlCol="0">
+            <a:spAutoFit/>
+          </a:bodyPr>
+          <a:lstStyle/>
+          <a:p>
+            <a:r>
+              <a:rPr lang="en-US" sz="1200" dirty="0"/>
+              <a:t>Source: www.actuarialopensource.com</a:t>
+            </a:r>
+          </a:p>
+        </p:txBody>
+      </p:sp>
+    </p:spTree>
+    <p:extLst>
+      <p:ext uri="{BB962C8B-B14F-4D97-AF65-F5344CB8AC3E}">
+        <p14:creationId xmlns:p14="http://schemas.microsoft.com/office/powerpoint/2010/main" val="1714853590"/>
+      </p:ext>
+    </p:extLst>
+  </p:cSld>
+  <p:clrMapOvr>
+    <a:masterClrMapping/>
+  </p:clrMapOvr>
+</p:sld>
+</file>
+
+<file path=ppt/slides/slide21.xml><?xml version="1.0" encoding="utf-8"?>
+<p:sld xmlns:a="http://schemas.openxmlformats.org/drawingml/2006/main" xmlns:r="http://schemas.openxmlformats.org/officeDocument/2006/relationships" xmlns:p="http://schemas.openxmlformats.org/presentationml/2006/main">
+  <p:cSld>
+    <p:spTree>
+      <p:nvGrpSpPr>
+        <p:cNvPr id="1" name=""/>
+        <p:cNvGrpSpPr/>
+        <p:nvPr/>
+      </p:nvGrpSpPr>
+      <p:grpSpPr>
+        <a:xfrm>
+          <a:off x="0" y="0"/>
+          <a:ext cx="0" cy="0"/>
+          <a:chOff x="0" y="0"/>
+          <a:chExt cx="0" cy="0"/>
+        </a:xfrm>
+      </p:grpSpPr>
+      <p:sp>
+        <p:nvSpPr>
+          <p:cNvPr id="3" name="TextBox 2">
+            <a:extLst>
+              <a:ext uri="{FF2B5EF4-FFF2-40B4-BE49-F238E27FC236}">
+                <a16:creationId xmlns:a16="http://schemas.microsoft.com/office/drawing/2014/main" id="{7D68518F-8E42-624D-9EC6-3FF6BE787A3E}"/>
+              </a:ext>
+            </a:extLst>
+          </p:cNvPr>
+          <p:cNvSpPr txBox="1"/>
+          <p:nvPr/>
+        </p:nvSpPr>
+        <p:spPr>
+          <a:xfrm>
+            <a:off x="1849119" y="1807048"/>
+            <a:ext cx="7675881" cy="1754326"/>
+          </a:xfrm>
+          <a:prstGeom prst="rect">
+            <a:avLst/>
+          </a:prstGeom>
+          <a:noFill/>
+        </p:spPr>
+        <p:txBody>
+          <a:bodyPr wrap="square">
+            <a:spAutoFit/>
+          </a:bodyPr>
+          <a:lstStyle/>
+          <a:p>
+            <a:pPr algn="l"/>
+            <a:r>
+              <a:rPr lang="en-US" b="0" i="0" dirty="0">
+                <a:solidFill>
+                  <a:srgbClr val="222222"/>
+                </a:solidFill>
+                <a:effectLst/>
+                <a:latin typeface="Calibri" panose="020F0502020204030204" pitchFamily="34" charset="0"/>
+                <a:cs typeface="Calibri" panose="020F0502020204030204" pitchFamily="34" charset="0"/>
+              </a:rPr>
+              <a:t>Papers with citation of the package:</a:t>
+            </a:r>
+          </a:p>
+          <a:p>
+            <a:pPr algn="l"/>
+            <a:endParaRPr lang="en-US" b="0" i="0" dirty="0">
+              <a:solidFill>
+                <a:srgbClr val="222222"/>
+              </a:solidFill>
+              <a:effectLst/>
+              <a:latin typeface="Calibri" panose="020F0502020204030204" pitchFamily="34" charset="0"/>
+              <a:cs typeface="Calibri" panose="020F0502020204030204" pitchFamily="34" charset="0"/>
+            </a:endParaRPr>
+          </a:p>
+          <a:p>
+            <a:pPr marL="285750" indent="-285750" algn="l">
+              <a:buFont typeface="Arial" panose="020B0604020202020204" pitchFamily="34" charset="0"/>
+              <a:buChar char="•"/>
+            </a:pPr>
+            <a:r>
+              <a:rPr lang="en-US" dirty="0">
+                <a:highlight>
+                  <a:srgbClr val="FFFFFF"/>
+                </a:highlight>
+                <a:latin typeface="Calibri" panose="020F0502020204030204" pitchFamily="34" charset="0"/>
+                <a:cs typeface="Calibri" panose="020F0502020204030204" pitchFamily="34" charset="0"/>
+              </a:rPr>
+              <a:t>The Actuary and IBNR Techniques: A Machine Learning Approach</a:t>
+            </a:r>
+          </a:p>
+          <a:p>
+            <a:pPr marL="285750" indent="-285750" algn="l">
+              <a:buFont typeface="Arial" panose="020B0604020202020204" pitchFamily="34" charset="0"/>
+              <a:buChar char="•"/>
+            </a:pPr>
+            <a:r>
+              <a:rPr lang="en-US" b="0" i="0" dirty="0">
+                <a:effectLst/>
+                <a:highlight>
+                  <a:srgbClr val="FFFFFF"/>
+                </a:highlight>
+                <a:latin typeface="Calibri" panose="020F0502020204030204" pitchFamily="34" charset="0"/>
+                <a:cs typeface="Calibri" panose="020F0502020204030204" pitchFamily="34" charset="0"/>
+              </a:rPr>
+              <a:t>Ultimate Loss Reserve Forecasting Using Bidirectional LSTMs</a:t>
+            </a:r>
+          </a:p>
+          <a:p>
+            <a:pPr marL="285750" indent="-285750" algn="l">
+              <a:buFont typeface="Arial" panose="020B0604020202020204" pitchFamily="34" charset="0"/>
+              <a:buChar char="•"/>
+            </a:pPr>
+            <a:r>
+              <a:rPr lang="en-US" b="0" i="0" dirty="0">
+                <a:effectLst/>
+                <a:highlight>
+                  <a:srgbClr val="FFFFFF"/>
+                </a:highlight>
+                <a:latin typeface="Calibri" panose="020F0502020204030204" pitchFamily="34" charset="0"/>
+                <a:cs typeface="Calibri" panose="020F0502020204030204" pitchFamily="34" charset="0"/>
+              </a:rPr>
+              <a:t>Practitioners’ Guide to Building Actuarial Reserving Workflows Using Chain-Ladder Python</a:t>
+            </a:r>
+            <a:endParaRPr lang="en-US" b="0" i="0" dirty="0">
+              <a:effectLst/>
+              <a:latin typeface="Calibri" panose="020F0502020204030204" pitchFamily="34" charset="0"/>
+              <a:cs typeface="Calibri" panose="020F0502020204030204" pitchFamily="34" charset="0"/>
+            </a:endParaRPr>
+          </a:p>
+        </p:txBody>
+      </p:sp>
+    </p:spTree>
+    <p:extLst>
+      <p:ext uri="{BB962C8B-B14F-4D97-AF65-F5344CB8AC3E}">
+        <p14:creationId xmlns:p14="http://schemas.microsoft.com/office/powerpoint/2010/main" val="1249469721"/>
       </p:ext>
     </p:extLst>
   </p:cSld>

</xml_diff>